<commit_message>
view detalhes ocorrencias ok
</commit_message>
<xml_diff>
--- a/Documentacao/apresentacao tcc.pptx
+++ b/Documentacao/apresentacao tcc.pptx
@@ -12,6 +12,8 @@
     <p:sldId id="265" r:id="rId6"/>
     <p:sldId id="258" r:id="rId7"/>
     <p:sldId id="266" r:id="rId8"/>
+    <p:sldId id="270" r:id="rId9"/>
+    <p:sldId id="269" r:id="rId10"/>
   </p:sldIdLst>
   <p:sldSz cx="12192000" cy="6858000"/>
   <p:notesSz cx="6858000" cy="9144000"/>
@@ -3188,6 +3190,14 @@
 <file path=ppt/slides/slide2.xml><?xml version="1.0" encoding="utf-8"?>
 <p:sld xmlns:a="http://schemas.openxmlformats.org/drawingml/2006/main" xmlns:r="http://schemas.openxmlformats.org/officeDocument/2006/relationships" xmlns:p="http://schemas.openxmlformats.org/presentationml/2006/main">
   <p:cSld>
+    <p:bg>
+      <p:bgPr>
+        <a:solidFill>
+          <a:schemeClr val="bg1"/>
+        </a:solidFill>
+        <a:effectLst/>
+      </p:bgPr>
+    </p:bg>
     <p:spTree>
       <p:nvGrpSpPr>
         <p:cNvPr id="1" name=""/>
@@ -3204,115 +3214,103 @@
       </p:grpSpPr>
       <p:sp>
         <p:nvSpPr>
-          <p:cNvPr id="2" name="Título 1"/>
-          <p:cNvSpPr>
-            <a:spLocks noGrp="1"/>
-          </p:cNvSpPr>
-          <p:nvPr>
-            <p:ph type="title"/>
+          <p:cNvPr id="71" name="Rectangle 70">
+            <a:extLst>
+              <a:ext uri="{FF2B5EF4-FFF2-40B4-BE49-F238E27FC236}">
+                <a16:creationId xmlns:a16="http://schemas.microsoft.com/office/drawing/2014/main" id="{63AB00AE-4340-440F-82E1-9F69D1D5519F}"/>
+              </a:ext>
+              <a:ext uri="{C183D7F6-B498-43B3-948B-1728B52AA6E4}">
+                <adec:decorative xmlns:adec="http://schemas.microsoft.com/office/drawing/2017/decorative" val="1"/>
+              </a:ext>
+            </a:extLst>
+          </p:cNvPr>
+          <p:cNvSpPr>
+            <a:spLocks noGrp="1" noRot="1" noChangeAspect="1" noMove="1" noResize="1" noEditPoints="1" noAdjustHandles="1" noChangeArrowheads="1" noChangeShapeType="1" noTextEdit="1"/>
+          </p:cNvSpPr>
+          <p:nvPr>
+            <p:extLst>
+              <p:ext uri="{386F3935-93C4-4BCD-93E2-E3B085C9AB24}">
+                <p16:designElem xmlns:p16="http://schemas.microsoft.com/office/powerpoint/2015/main" val="1"/>
+              </p:ext>
+            </p:extLst>
           </p:nvPr>
         </p:nvSpPr>
         <p:spPr>
           <a:xfrm>
-            <a:off x="372533" y="203497"/>
-            <a:ext cx="9404723" cy="1400530"/>
-          </a:xfrm>
+            <a:off x="0" y="0"/>
+            <a:ext cx="12192000" cy="6858000"/>
+          </a:xfrm>
+          <a:prstGeom prst="rect">
+            <a:avLst/>
+          </a:prstGeom>
+          <a:solidFill>
+            <a:srgbClr val="FFFFFF"/>
+          </a:solidFill>
+          <a:ln w="12700" cap="flat" cmpd="sng" algn="ctr">
+            <a:noFill/>
+            <a:prstDash val="solid"/>
+            <a:miter lim="800000"/>
+          </a:ln>
+          <a:effectLst/>
         </p:spPr>
-        <p:txBody>
-          <a:bodyPr/>
-          <a:lstStyle/>
-          <a:p>
-            <a:pPr algn="l"/>
-            <a:r>
-              <a:rPr lang="pt-BR" b="1" dirty="0">
-                <a:solidFill>
-                  <a:schemeClr val="accent5">
-                    <a:lumMod val="50000"/>
-                  </a:schemeClr>
-                </a:solidFill>
-              </a:rPr>
-              <a:t>Introdução</a:t>
-            </a:r>
-          </a:p>
-        </p:txBody>
-      </p:sp>
-      <p:sp>
-        <p:nvSpPr>
-          <p:cNvPr id="3" name="Espaço Reservado para Conteúdo 2"/>
-          <p:cNvSpPr>
-            <a:spLocks noGrp="1"/>
-          </p:cNvSpPr>
-          <p:nvPr>
-            <p:ph idx="1"/>
-          </p:nvPr>
-        </p:nvSpPr>
-        <p:spPr>
+        <p:style>
+          <a:lnRef idx="2">
+            <a:schemeClr val="accent1">
+              <a:shade val="50000"/>
+            </a:schemeClr>
+          </a:lnRef>
+          <a:fillRef idx="1">
+            <a:schemeClr val="accent1"/>
+          </a:fillRef>
+          <a:effectRef idx="0">
+            <a:schemeClr val="accent1"/>
+          </a:effectRef>
+          <a:fontRef idx="minor">
+            <a:schemeClr val="lt1"/>
+          </a:fontRef>
+        </p:style>
+        <p:txBody>
+          <a:bodyPr rtlCol="0" anchor="ctr"/>
+          <a:lstStyle/>
+          <a:p>
+            <a:pPr algn="ctr"/>
+            <a:endParaRPr lang="en-US"/>
+          </a:p>
+        </p:txBody>
+      </p:sp>
+      <p:pic>
+        <p:nvPicPr>
+          <p:cNvPr id="5" name="Picture 2" descr="Resultado de imagem para pessoas olhando para outdoors"/>
+          <p:cNvPicPr>
+            <a:picLocks noChangeAspect="1" noChangeArrowheads="1"/>
+          </p:cNvPicPr>
+          <p:nvPr/>
+        </p:nvPicPr>
+        <p:blipFill rotWithShape="1">
+          <a:blip r:embed="rId2">
+            <a:alphaModFix/>
+            <a:extLst>
+              <a:ext uri="{28A0092B-C50C-407E-A947-70E740481C1C}">
+                <a14:useLocalDpi xmlns:a14="http://schemas.microsoft.com/office/drawing/2010/main" val="0"/>
+              </a:ext>
+            </a:extLst>
+          </a:blip>
+          <a:srcRect t="35150" b="2361"/>
+          <a:stretch/>
+        </p:blipFill>
+        <p:spPr bwMode="auto">
           <a:xfrm>
-            <a:off x="216741" y="2191367"/>
-            <a:ext cx="5606990" cy="4195481"/>
-          </a:xfrm>
+            <a:off x="6083786" y="-168316"/>
+            <a:ext cx="6261330" cy="3932313"/>
+          </a:xfrm>
+          <a:prstGeom prst="rect">
+            <a:avLst/>
+          </a:prstGeom>
+          <a:effectLst>
+            <a:softEdge rad="533400"/>
+          </a:effectLst>
         </p:spPr>
-        <p:txBody>
-          <a:bodyPr>
-            <a:normAutofit/>
-          </a:bodyPr>
-          <a:lstStyle/>
-          <a:p>
-            <a:pPr algn="just"/>
-            <a:r>
-              <a:rPr lang="pt-BR" sz="3500" dirty="0"/>
-              <a:t>Objetivo;</a:t>
-            </a:r>
-          </a:p>
-          <a:p>
-            <a:pPr marL="0" indent="0" algn="just">
-              <a:buNone/>
-            </a:pPr>
-            <a:r>
-              <a:rPr lang="pt-BR" sz="1800" dirty="0"/>
-              <a:t>Desenvolver um sistema  </a:t>
-            </a:r>
-            <a:r>
-              <a:rPr lang="pt-BR" sz="1800" dirty="0" err="1"/>
-              <a:t>helpdesk</a:t>
-            </a:r>
-            <a:r>
-              <a:rPr lang="pt-BR" sz="1800" dirty="0"/>
-              <a:t> em </a:t>
-            </a:r>
-            <a:r>
-              <a:rPr lang="pt-BR" sz="1800" dirty="0" err="1"/>
-              <a:t>Laravel</a:t>
-            </a:r>
-            <a:r>
-              <a:rPr lang="pt-BR" sz="1800" dirty="0"/>
-              <a:t>;</a:t>
-            </a:r>
-            <a:endParaRPr lang="pt-BR" sz="3500" dirty="0"/>
-          </a:p>
-          <a:p>
-            <a:pPr algn="just"/>
-            <a:r>
-              <a:rPr lang="pt-BR" sz="3500" dirty="0"/>
-              <a:t>Justificativa;</a:t>
-            </a:r>
-          </a:p>
-          <a:p>
-            <a:pPr algn="just"/>
-            <a:r>
-              <a:rPr lang="pt-BR" sz="1800" b="0" i="0" u="none" strike="noStrike" dirty="0">
-                <a:solidFill>
-                  <a:srgbClr val="000000"/>
-                </a:solidFill>
-                <a:effectLst/>
-                <a:latin typeface="Arial" panose="020B0604020202020204" pitchFamily="34" charset="0"/>
-              </a:rPr>
-              <a:t>consistência no processo de registro das ocorrências;</a:t>
-            </a:r>
-            <a:endParaRPr lang="pt-BR" sz="3500" dirty="0"/>
-          </a:p>
-        </p:txBody>
-      </p:sp>
+      </p:pic>
       <p:pic>
         <p:nvPicPr>
           <p:cNvPr id="1026" name="Picture 2" descr="Resultado de imagem para introduÃ§Ã£o"/>
@@ -3321,48 +3319,7 @@
           </p:cNvPicPr>
           <p:nvPr/>
         </p:nvPicPr>
-        <p:blipFill>
-          <a:blip r:embed="rId2">
-            <a:extLst>
-              <a:ext uri="{28A0092B-C50C-407E-A947-70E740481C1C}">
-                <a14:useLocalDpi xmlns:a14="http://schemas.microsoft.com/office/drawing/2010/main" val="0"/>
-              </a:ext>
-            </a:extLst>
-          </a:blip>
-          <a:srcRect/>
-          <a:stretch>
-            <a:fillRect/>
-          </a:stretch>
-        </p:blipFill>
-        <p:spPr bwMode="auto">
-          <a:xfrm>
-            <a:off x="8609870" y="3108200"/>
-            <a:ext cx="3484746" cy="2586336"/>
-          </a:xfrm>
-          <a:prstGeom prst="rect">
-            <a:avLst/>
-          </a:prstGeom>
-          <a:ln>
-            <a:noFill/>
-          </a:ln>
-          <a:effectLst>
-            <a:outerShdw blurRad="292100" dist="139700" dir="2700000" algn="tl" rotWithShape="0">
-              <a:srgbClr val="333333">
-                <a:alpha val="65000"/>
-              </a:srgbClr>
-            </a:outerShdw>
-          </a:effectLst>
-        </p:spPr>
-      </p:pic>
-      <p:pic>
-        <p:nvPicPr>
-          <p:cNvPr id="5" name="Picture 2" descr="Resultado de imagem para pessoas olhando para outdoors"/>
-          <p:cNvPicPr>
-            <a:picLocks noChangeAspect="1" noChangeArrowheads="1"/>
-          </p:cNvPicPr>
-          <p:nvPr/>
-        </p:nvPicPr>
-        <p:blipFill>
+        <p:blipFill rotWithShape="1">
           <a:blip r:embed="rId3">
             <a:extLst>
               <a:ext uri="{28A0092B-C50C-407E-A947-70E740481C1C}">
@@ -3370,38 +3327,44 @@
               </a:ext>
             </a:extLst>
           </a:blip>
-          <a:srcRect/>
-          <a:stretch>
-            <a:fillRect/>
-          </a:stretch>
+          <a:srcRect t="8597" r="-1" b="764"/>
+          <a:stretch/>
         </p:blipFill>
         <p:spPr bwMode="auto">
           <a:xfrm>
-            <a:off x="5823731" y="3000087"/>
-            <a:ext cx="2786139" cy="2802561"/>
+            <a:off x="6089904" y="2487166"/>
+            <a:ext cx="6263640" cy="4215384"/>
           </a:xfrm>
           <a:prstGeom prst="rect">
             <a:avLst/>
           </a:prstGeom>
-          <a:ln>
-            <a:noFill/>
-          </a:ln>
           <a:effectLst>
-            <a:outerShdw blurRad="292100" dist="139700" dir="2700000" algn="tl" rotWithShape="0">
-              <a:srgbClr val="333333">
-                <a:alpha val="65000"/>
-              </a:srgbClr>
-            </a:outerShdw>
+            <a:softEdge rad="533400"/>
           </a:effectLst>
         </p:spPr>
       </p:pic>
       <p:pic>
         <p:nvPicPr>
-          <p:cNvPr id="6" name="Picture 4" descr="Resultado de imagem para pessoas olhando para facebook"/>
+          <p:cNvPr id="73" name="Picture 72">
+            <a:extLst>
+              <a:ext uri="{FF2B5EF4-FFF2-40B4-BE49-F238E27FC236}">
+                <a16:creationId xmlns:a16="http://schemas.microsoft.com/office/drawing/2014/main" id="{22901FED-4FC9-4ED5-8123-C98BCD1616BA}"/>
+              </a:ext>
+              <a:ext uri="{C183D7F6-B498-43B3-948B-1728B52AA6E4}">
+                <adec:decorative xmlns:adec="http://schemas.microsoft.com/office/drawing/2017/decorative" val="1"/>
+              </a:ext>
+            </a:extLst>
+          </p:cNvPr>
           <p:cNvPicPr>
-            <a:picLocks noChangeAspect="1" noChangeArrowheads="1"/>
+            <a:picLocks noGrp="1" noRot="1" noChangeAspect="1" noMove="1" noResize="1" noEditPoints="1" noAdjustHandles="1" noChangeArrowheads="1" noChangeShapeType="1" noCrop="1"/>
           </p:cNvPicPr>
-          <p:nvPr/>
+          <p:nvPr>
+            <p:extLst>
+              <p:ext uri="{386F3935-93C4-4BCD-93E2-E3B085C9AB24}">
+                <p16:designElem xmlns:p16="http://schemas.microsoft.com/office/powerpoint/2015/main" val="1"/>
+              </p:ext>
+            </p:extLst>
+          </p:nvPr>
         </p:nvPicPr>
         <p:blipFill>
           <a:blip r:embed="rId4">
@@ -3411,72 +3374,158 @@
               </a:ext>
             </a:extLst>
           </a:blip>
-          <a:srcRect/>
           <a:stretch>
             <a:fillRect/>
           </a:stretch>
         </p:blipFill>
-        <p:spPr bwMode="auto">
+        <p:spPr>
           <a:xfrm>
-            <a:off x="8128189" y="230682"/>
-            <a:ext cx="3808381" cy="2526974"/>
+            <a:off x="0" y="0"/>
+            <a:ext cx="12192000" cy="6858000"/>
           </a:xfrm>
           <a:prstGeom prst="rect">
             <a:avLst/>
           </a:prstGeom>
-          <a:ln>
-            <a:noFill/>
-          </a:ln>
-          <a:effectLst>
-            <a:outerShdw blurRad="292100" dist="139700" dir="2700000" algn="tl" rotWithShape="0">
-              <a:srgbClr val="333333">
-                <a:alpha val="65000"/>
-              </a:srgbClr>
-            </a:outerShdw>
-          </a:effectLst>
         </p:spPr>
       </p:pic>
-      <p:pic>
-        <p:nvPicPr>
-          <p:cNvPr id="7" name="Picture 6" descr="Resultado de imagem para pessoas olhando para celular"/>
-          <p:cNvPicPr>
-            <a:picLocks noChangeAspect="1" noChangeArrowheads="1"/>
-          </p:cNvPicPr>
-          <p:nvPr/>
-        </p:nvPicPr>
-        <p:blipFill>
-          <a:blip r:embed="rId5">
-            <a:extLst>
-              <a:ext uri="{28A0092B-C50C-407E-A947-70E740481C1C}">
-                <a14:useLocalDpi xmlns:a14="http://schemas.microsoft.com/office/drawing/2010/main" val="0"/>
-              </a:ext>
-            </a:extLst>
-          </a:blip>
-          <a:srcRect/>
-          <a:stretch>
-            <a:fillRect/>
-          </a:stretch>
-        </p:blipFill>
-        <p:spPr bwMode="auto">
+      <p:sp>
+        <p:nvSpPr>
+          <p:cNvPr id="2" name="Título 1"/>
+          <p:cNvSpPr>
+            <a:spLocks noGrp="1"/>
+          </p:cNvSpPr>
+          <p:nvPr>
+            <p:ph type="title"/>
+          </p:nvPr>
+        </p:nvSpPr>
+        <p:spPr>
           <a:xfrm>
-            <a:off x="4403358" y="230682"/>
-            <a:ext cx="3575128" cy="2388185"/>
-          </a:xfrm>
-          <a:prstGeom prst="rect">
-            <a:avLst/>
-          </a:prstGeom>
-          <a:ln>
-            <a:noFill/>
-          </a:ln>
-          <a:effectLst>
-            <a:outerShdw blurRad="292100" dist="139700" dir="2700000" algn="tl" rotWithShape="0">
-              <a:srgbClr val="333333">
-                <a:alpha val="65000"/>
-              </a:srgbClr>
-            </a:outerShdw>
-          </a:effectLst>
+            <a:off x="804998" y="798445"/>
+            <a:ext cx="4803636" cy="1311664"/>
+          </a:xfrm>
         </p:spPr>
-      </p:pic>
+        <p:txBody>
+          <a:bodyPr>
+            <a:normAutofit/>
+          </a:bodyPr>
+          <a:lstStyle/>
+          <a:p>
+            <a:r>
+              <a:rPr lang="pt-BR" sz="4000" b="1">
+                <a:solidFill>
+                  <a:srgbClr val="000000"/>
+                </a:solidFill>
+              </a:rPr>
+              <a:t>Introdução</a:t>
+            </a:r>
+          </a:p>
+        </p:txBody>
+      </p:sp>
+      <p:sp>
+        <p:nvSpPr>
+          <p:cNvPr id="3" name="Espaço Reservado para Conteúdo 2"/>
+          <p:cNvSpPr>
+            <a:spLocks noGrp="1"/>
+          </p:cNvSpPr>
+          <p:nvPr>
+            <p:ph idx="1"/>
+          </p:nvPr>
+        </p:nvSpPr>
+        <p:spPr>
+          <a:xfrm>
+            <a:off x="804997" y="2272143"/>
+            <a:ext cx="4803637" cy="3788830"/>
+          </a:xfrm>
+        </p:spPr>
+        <p:txBody>
+          <a:bodyPr anchor="ctr">
+            <a:normAutofit/>
+          </a:bodyPr>
+          <a:lstStyle/>
+          <a:p>
+            <a:r>
+              <a:rPr lang="pt-BR" sz="2000" dirty="0">
+                <a:solidFill>
+                  <a:srgbClr val="000000"/>
+                </a:solidFill>
+              </a:rPr>
+              <a:t>Objetivo</a:t>
+            </a:r>
+          </a:p>
+          <a:p>
+            <a:pPr marL="0" indent="0">
+              <a:buNone/>
+            </a:pPr>
+            <a:r>
+              <a:rPr lang="pt-BR" sz="2000" dirty="0">
+                <a:solidFill>
+                  <a:srgbClr val="000000"/>
+                </a:solidFill>
+              </a:rPr>
+              <a:t>Desenvolver um sistema  </a:t>
+            </a:r>
+            <a:r>
+              <a:rPr lang="pt-BR" sz="2000" dirty="0" err="1">
+                <a:solidFill>
+                  <a:srgbClr val="000000"/>
+                </a:solidFill>
+              </a:rPr>
+              <a:t>helpdesk</a:t>
+            </a:r>
+            <a:r>
+              <a:rPr lang="pt-BR" sz="2000" dirty="0">
+                <a:solidFill>
+                  <a:srgbClr val="000000"/>
+                </a:solidFill>
+              </a:rPr>
+              <a:t> em </a:t>
+            </a:r>
+            <a:r>
+              <a:rPr lang="pt-BR" sz="2000" dirty="0" err="1">
+                <a:solidFill>
+                  <a:srgbClr val="000000"/>
+                </a:solidFill>
+              </a:rPr>
+              <a:t>Laravel</a:t>
+            </a:r>
+            <a:r>
+              <a:rPr lang="pt-BR" sz="2000" dirty="0">
+                <a:solidFill>
+                  <a:srgbClr val="000000"/>
+                </a:solidFill>
+              </a:rPr>
+              <a:t>;</a:t>
+            </a:r>
+          </a:p>
+          <a:p>
+            <a:r>
+              <a:rPr lang="pt-BR" sz="2000" dirty="0">
+                <a:solidFill>
+                  <a:srgbClr val="000000"/>
+                </a:solidFill>
+              </a:rPr>
+              <a:t>Justificativa</a:t>
+            </a:r>
+          </a:p>
+          <a:p>
+            <a:r>
+              <a:rPr lang="pt-BR" sz="2000" b="0" i="0" u="none" strike="noStrike" dirty="0">
+                <a:solidFill>
+                  <a:srgbClr val="000000"/>
+                </a:solidFill>
+                <a:effectLst/>
+                <a:latin typeface="Arial" panose="020B0604020202020204" pitchFamily="34" charset="0"/>
+              </a:rPr>
+              <a:t>consistência no processo de registro das ocorrências;</a:t>
+            </a:r>
+            <a:endParaRPr lang="pt-BR" sz="2000" dirty="0">
+              <a:solidFill>
+                <a:srgbClr val="000000"/>
+              </a:solidFill>
+            </a:endParaRPr>
+          </a:p>
+        </p:txBody>
+      </p:sp>
     </p:spTree>
     <p:extLst>
       <p:ext uri="{BB962C8B-B14F-4D97-AF65-F5344CB8AC3E}">
@@ -3566,7 +3615,7 @@
             <a:pPr algn="just"/>
             <a:r>
               <a:rPr lang="pt-BR" sz="3500" dirty="0"/>
-              <a:t>Problematização;</a:t>
+              <a:t>Problematização</a:t>
             </a:r>
           </a:p>
           <a:p>
@@ -3599,7 +3648,7 @@
             <a:pPr algn="just"/>
             <a:r>
               <a:rPr lang="pt-BR" sz="3500" dirty="0"/>
-              <a:t>Metodologia.</a:t>
+              <a:t>Metodologia</a:t>
             </a:r>
           </a:p>
           <a:p>
@@ -3655,7 +3704,10 @@
     <p:bg>
       <p:bgPr>
         <a:solidFill>
-          <a:schemeClr val="bg1"/>
+          <a:schemeClr val="bg1">
+            <a:tint val="95000"/>
+            <a:satMod val="170000"/>
+          </a:schemeClr>
         </a:solidFill>
         <a:effectLst/>
       </p:bgPr>
@@ -3676,10 +3728,46 @@
       </p:grpSpPr>
       <p:sp>
         <p:nvSpPr>
-          <p:cNvPr id="18" name="Rectangle 17">
+          <p:cNvPr id="2" name="Título 1"/>
+          <p:cNvSpPr>
+            <a:spLocks noGrp="1"/>
+          </p:cNvSpPr>
+          <p:nvPr>
+            <p:ph type="title"/>
+          </p:nvPr>
+        </p:nvSpPr>
+        <p:spPr>
+          <a:xfrm>
+            <a:off x="4128368" y="4921823"/>
+            <a:ext cx="4937937" cy="1147150"/>
+          </a:xfrm>
+        </p:spPr>
+        <p:txBody>
+          <a:bodyPr vert="horz" lIns="91440" tIns="45720" rIns="91440" bIns="45720" rtlCol="0" anchor="t">
+            <a:normAutofit/>
+          </a:bodyPr>
+          <a:lstStyle/>
+          <a:p>
+            <a:r>
+              <a:rPr lang="en-US" sz="4100" kern="1200">
+                <a:solidFill>
+                  <a:schemeClr val="tx1"/>
+                </a:solidFill>
+                <a:latin typeface="+mj-lt"/>
+                <a:ea typeface="+mj-ea"/>
+                <a:cs typeface="+mj-cs"/>
+              </a:rPr>
+              <a:t>Tecnologias utilizadas</a:t>
+            </a:r>
+          </a:p>
+        </p:txBody>
+      </p:sp>
+      <p:sp>
+        <p:nvSpPr>
+          <p:cNvPr id="33" name="Oval 32">
             <a:extLst>
               <a:ext uri="{FF2B5EF4-FFF2-40B4-BE49-F238E27FC236}">
-                <a16:creationId xmlns:a16="http://schemas.microsoft.com/office/drawing/2014/main" id="{4D834D36-D981-4EDD-B062-077BAB9C7133}"/>
+                <a16:creationId xmlns:a16="http://schemas.microsoft.com/office/drawing/2014/main" id="{C20267F5-D4E6-477A-A590-81F2ABD1B862}"/>
               </a:ext>
               <a:ext uri="{C183D7F6-B498-43B3-948B-1728B52AA6E4}">
                 <adec:decorative xmlns:adec="http://schemas.microsoft.com/office/drawing/2017/decorative" val="1"/>
@@ -3699,38 +3787,17 @@
         </p:nvSpPr>
         <p:spPr>
           <a:xfrm>
-            <a:off x="1" y="0"/>
-            <a:ext cx="12191314" cy="6858000"/>
-          </a:xfrm>
-          <a:prstGeom prst="rect">
+            <a:off x="3585109" y="2382976"/>
+            <a:ext cx="1920240" cy="1920240"/>
+          </a:xfrm>
+          <a:prstGeom prst="ellipse">
             <a:avLst/>
           </a:prstGeom>
-          <a:gradFill>
-            <a:gsLst>
-              <a:gs pos="0">
-                <a:schemeClr val="accent1">
-                  <a:lumMod val="100000"/>
-                  <a:alpha val="82000"/>
-                </a:schemeClr>
-              </a:gs>
-              <a:gs pos="25000">
-                <a:schemeClr val="accent1">
-                  <a:alpha val="60000"/>
-                </a:schemeClr>
-              </a:gs>
-              <a:gs pos="94000">
-                <a:schemeClr val="bg2">
-                  <a:lumMod val="75000"/>
-                </a:schemeClr>
-              </a:gs>
-              <a:gs pos="100000">
-                <a:schemeClr val="bg2">
-                  <a:lumMod val="75000"/>
-                </a:schemeClr>
-              </a:gs>
-            </a:gsLst>
-            <a:lin ang="4200000" scaled="0"/>
-          </a:gradFill>
+          <a:solidFill>
+            <a:srgbClr val="FFFFFF">
+              <a:alpha val="80000"/>
+            </a:srgbClr>
+          </a:solidFill>
           <a:ln>
             <a:noFill/>
           </a:ln>
@@ -3755,26 +3822,55 @@
           <a:bodyPr rtlCol="0" anchor="ctr"/>
           <a:lstStyle/>
           <a:p>
-            <a:pPr algn="ctr"/>
-            <a:endParaRPr lang="en-US"/>
-          </a:p>
-        </p:txBody>
-      </p:sp>
-      <p:pic>
-        <p:nvPicPr>
-          <p:cNvPr id="20" name="Picture 19">
+            <a:pPr marL="0" marR="0" lvl="0" indent="0" algn="ctr" defTabSz="914400" rtl="0" eaLnBrk="1" fontAlgn="auto" latinLnBrk="0" hangingPunct="1">
+              <a:lnSpc>
+                <a:spcPct val="100000"/>
+              </a:lnSpc>
+              <a:spcBef>
+                <a:spcPts val="0"/>
+              </a:spcBef>
+              <a:spcAft>
+                <a:spcPts val="0"/>
+              </a:spcAft>
+              <a:buClrTx/>
+              <a:buSzTx/>
+              <a:buFontTx/>
+              <a:buNone/>
+              <a:tabLst/>
+              <a:defRPr/>
+            </a:pPr>
+            <a:endParaRPr kumimoji="0" lang="en-US" sz="1800" b="0" i="0" u="none" strike="noStrike" kern="1200" cap="none" spc="0" normalizeH="0" baseline="0" noProof="0">
+              <a:ln>
+                <a:noFill/>
+              </a:ln>
+              <a:solidFill>
+                <a:prstClr val="white"/>
+              </a:solidFill>
+              <a:effectLst/>
+              <a:uLnTx/>
+              <a:uFillTx/>
+              <a:latin typeface="Calibri" panose="020F0502020204030204"/>
+              <a:ea typeface="+mn-ea"/>
+              <a:cs typeface="+mn-cs"/>
+            </a:endParaRPr>
+          </a:p>
+        </p:txBody>
+      </p:sp>
+      <p:sp>
+        <p:nvSpPr>
+          <p:cNvPr id="35" name="Freeform: Shape 34">
             <a:extLst>
               <a:ext uri="{FF2B5EF4-FFF2-40B4-BE49-F238E27FC236}">
-                <a16:creationId xmlns:a16="http://schemas.microsoft.com/office/drawing/2014/main" id="{6CFD523C-CC0D-41EB-B7F7-C615B5715FEB}"/>
+                <a16:creationId xmlns:a16="http://schemas.microsoft.com/office/drawing/2014/main" id="{F6E384F5-137A-40B1-97F0-694CC6ECD59C}"/>
               </a:ext>
               <a:ext uri="{C183D7F6-B498-43B3-948B-1728B52AA6E4}">
                 <adec:decorative xmlns:adec="http://schemas.microsoft.com/office/drawing/2017/decorative" val="1"/>
               </a:ext>
             </a:extLst>
           </p:cNvPr>
-          <p:cNvPicPr>
-            <a:picLocks noGrp="1" noRot="1" noChangeAspect="1" noMove="1" noResize="1" noEditPoints="1" noAdjustHandles="1" noChangeArrowheads="1" noChangeShapeType="1" noCrop="1"/>
-          </p:cNvPicPr>
+          <p:cNvSpPr>
+            <a:spLocks noGrp="1" noRot="1" noChangeAspect="1" noMove="1" noResize="1" noEditPoints="1" noAdjustHandles="1" noChangeArrowheads="1" noChangeShapeType="1" noTextEdit="1"/>
+          </p:cNvSpPr>
           <p:nvPr>
             <p:extLst>
               <p:ext uri="{386F3935-93C4-4BCD-93E2-E3B085C9AB24}">
@@ -3782,306 +3878,31 @@
               </p:ext>
             </p:extLst>
           </p:nvPr>
-        </p:nvPicPr>
-        <p:blipFill>
-          <a:blip r:embed="rId2">
-            <a:extLst>
-              <a:ext uri="{28A0092B-C50C-407E-A947-70E740481C1C}">
-                <a14:useLocalDpi xmlns:a14="http://schemas.microsoft.com/office/drawing/2010/main" val="0"/>
-              </a:ext>
-            </a:extLst>
-          </a:blip>
-          <a:stretch>
-            <a:fillRect/>
-          </a:stretch>
-        </p:blipFill>
+        </p:nvSpPr>
         <p:spPr>
           <a:xfrm>
-            <a:off x="0" y="0"/>
-            <a:ext cx="12192000" cy="6858000"/>
-          </a:xfrm>
-          <a:prstGeom prst="rect">
-            <a:avLst/>
-          </a:prstGeom>
-        </p:spPr>
-      </p:pic>
-      <p:sp>
-        <p:nvSpPr>
-          <p:cNvPr id="2" name="Título 1"/>
-          <p:cNvSpPr>
-            <a:spLocks noGrp="1"/>
-          </p:cNvSpPr>
-          <p:nvPr>
-            <p:ph type="title"/>
-          </p:nvPr>
-        </p:nvSpPr>
-        <p:spPr>
-          <a:xfrm>
-            <a:off x="4959407" y="5059192"/>
-            <a:ext cx="6432472" cy="1110439"/>
-          </a:xfrm>
-        </p:spPr>
-        <p:txBody>
-          <a:bodyPr vert="horz" lIns="91440" tIns="45720" rIns="91440" bIns="45720" rtlCol="0" anchor="t">
-            <a:normAutofit/>
-          </a:bodyPr>
-          <a:lstStyle/>
-          <a:p>
-            <a:pPr algn="r"/>
-            <a:r>
-              <a:rPr lang="en-US" sz="3600">
-                <a:solidFill>
-                  <a:srgbClr val="000000"/>
-                </a:solidFill>
-              </a:rPr>
-              <a:t>Desenvolvido em:</a:t>
-            </a:r>
-          </a:p>
-        </p:txBody>
-      </p:sp>
-      <p:sp>
-        <p:nvSpPr>
-          <p:cNvPr id="22" name="Freeform 68">
-            <a:extLst>
-              <a:ext uri="{FF2B5EF4-FFF2-40B4-BE49-F238E27FC236}">
-                <a16:creationId xmlns:a16="http://schemas.microsoft.com/office/drawing/2014/main" id="{251BB4E6-C169-431D-9D53-2BBEBFFD1562}"/>
-              </a:ext>
-              <a:ext uri="{C183D7F6-B498-43B3-948B-1728B52AA6E4}">
-                <adec:decorative xmlns:adec="http://schemas.microsoft.com/office/drawing/2017/decorative" val="1"/>
-              </a:ext>
-            </a:extLst>
-          </p:cNvPr>
-          <p:cNvSpPr>
-            <a:spLocks noGrp="1" noRot="1" noChangeAspect="1" noMove="1" noResize="1" noEditPoints="1" noAdjustHandles="1" noChangeArrowheads="1" noChangeShapeType="1" noTextEdit="1"/>
-          </p:cNvSpPr>
-          <p:nvPr>
-            <p:extLst>
-              <p:ext uri="{386F3935-93C4-4BCD-93E2-E3B085C9AB24}">
-                <p16:designElem xmlns:p16="http://schemas.microsoft.com/office/powerpoint/2015/main" val="1"/>
-              </p:ext>
-            </p:extLst>
-          </p:nvPr>
-        </p:nvSpPr>
-        <p:spPr>
-          <a:xfrm>
-            <a:off x="1479782" y="2"/>
-            <a:ext cx="3614335" cy="2178813"/>
+            <a:off x="0" y="2122218"/>
+            <a:ext cx="3730752" cy="4735782"/>
           </a:xfrm>
           <a:custGeom>
             <a:avLst/>
             <a:gdLst>
-              <a:gd name="connsiteX0" fmla="*/ 38628 w 3614335"/>
-              <a:gd name="connsiteY0" fmla="*/ 0 h 2178813"/>
-              <a:gd name="connsiteX1" fmla="*/ 3575707 w 3614335"/>
-              <a:gd name="connsiteY1" fmla="*/ 0 h 2178813"/>
-              <a:gd name="connsiteX2" fmla="*/ 3577619 w 3614335"/>
-              <a:gd name="connsiteY2" fmla="*/ 7439 h 2178813"/>
-              <a:gd name="connsiteX3" fmla="*/ 3614335 w 3614335"/>
-              <a:gd name="connsiteY3" fmla="*/ 371646 h 2178813"/>
-              <a:gd name="connsiteX4" fmla="*/ 1807167 w 3614335"/>
-              <a:gd name="connsiteY4" fmla="*/ 2178813 h 2178813"/>
-              <a:gd name="connsiteX5" fmla="*/ 0 w 3614335"/>
-              <a:gd name="connsiteY5" fmla="*/ 371646 h 2178813"/>
-              <a:gd name="connsiteX6" fmla="*/ 36715 w 3614335"/>
-              <a:gd name="connsiteY6" fmla="*/ 7439 h 2178813"/>
-            </a:gdLst>
-            <a:ahLst/>
-            <a:cxnLst>
-              <a:cxn ang="0">
-                <a:pos x="connsiteX0" y="connsiteY0"/>
-              </a:cxn>
-              <a:cxn ang="0">
-                <a:pos x="connsiteX1" y="connsiteY1"/>
-              </a:cxn>
-              <a:cxn ang="0">
-                <a:pos x="connsiteX2" y="connsiteY2"/>
-              </a:cxn>
-              <a:cxn ang="0">
-                <a:pos x="connsiteX3" y="connsiteY3"/>
-              </a:cxn>
-              <a:cxn ang="0">
-                <a:pos x="connsiteX4" y="connsiteY4"/>
-              </a:cxn>
-              <a:cxn ang="0">
-                <a:pos x="connsiteX5" y="connsiteY5"/>
-              </a:cxn>
-              <a:cxn ang="0">
-                <a:pos x="connsiteX6" y="connsiteY6"/>
-              </a:cxn>
-            </a:cxnLst>
-            <a:rect l="l" t="t" r="r" b="b"/>
-            <a:pathLst>
-              <a:path w="3614335" h="2178813">
-                <a:moveTo>
-                  <a:pt x="38628" y="0"/>
-                </a:moveTo>
-                <a:lnTo>
-                  <a:pt x="3575707" y="0"/>
-                </a:lnTo>
-                <a:lnTo>
-                  <a:pt x="3577619" y="7439"/>
-                </a:lnTo>
-                <a:cubicBezTo>
-                  <a:pt x="3601692" y="125081"/>
-                  <a:pt x="3614335" y="246887"/>
-                  <a:pt x="3614335" y="371646"/>
-                </a:cubicBezTo>
-                <a:cubicBezTo>
-                  <a:pt x="3614335" y="1369717"/>
-                  <a:pt x="2805239" y="2178813"/>
-                  <a:pt x="1807167" y="2178813"/>
-                </a:cubicBezTo>
-                <a:cubicBezTo>
-                  <a:pt x="809097" y="2178813"/>
-                  <a:pt x="0" y="1369717"/>
-                  <a:pt x="0" y="371646"/>
-                </a:cubicBezTo>
-                <a:cubicBezTo>
-                  <a:pt x="0" y="246887"/>
-                  <a:pt x="12642" y="125081"/>
-                  <a:pt x="36715" y="7439"/>
-                </a:cubicBezTo>
-                <a:close/>
-              </a:path>
-            </a:pathLst>
-          </a:custGeom>
-          <a:solidFill>
-            <a:srgbClr val="FFFFFF"/>
-          </a:solidFill>
-          <a:ln>
-            <a:gradFill>
-              <a:gsLst>
-                <a:gs pos="0">
-                  <a:schemeClr val="accent1">
-                    <a:lumMod val="40000"/>
-                    <a:lumOff val="60000"/>
-                  </a:schemeClr>
-                </a:gs>
-                <a:gs pos="23000">
-                  <a:schemeClr val="accent1">
-                    <a:lumMod val="45000"/>
-                    <a:lumOff val="55000"/>
-                  </a:schemeClr>
-                </a:gs>
-                <a:gs pos="83000">
-                  <a:schemeClr val="bg2">
-                    <a:lumMod val="75000"/>
-                  </a:schemeClr>
-                </a:gs>
-                <a:gs pos="100000">
-                  <a:schemeClr val="bg2">
-                    <a:lumMod val="75000"/>
-                  </a:schemeClr>
-                </a:gs>
-              </a:gsLst>
-              <a:lin ang="5400000" scaled="1"/>
-            </a:gradFill>
-          </a:ln>
-        </p:spPr>
-        <p:style>
-          <a:lnRef idx="2">
-            <a:schemeClr val="accent1">
-              <a:shade val="50000"/>
-            </a:schemeClr>
-          </a:lnRef>
-          <a:fillRef idx="1">
-            <a:schemeClr val="accent1"/>
-          </a:fillRef>
-          <a:effectRef idx="0">
-            <a:schemeClr val="accent1"/>
-          </a:effectRef>
-          <a:fontRef idx="minor">
-            <a:schemeClr val="lt1"/>
-          </a:fontRef>
-        </p:style>
-        <p:txBody>
-          <a:bodyPr wrap="square" rtlCol="0" anchor="ctr">
-            <a:noAutofit/>
-          </a:bodyPr>
-          <a:lstStyle/>
-          <a:p>
-            <a:pPr algn="ctr"/>
-            <a:endParaRPr lang="en-US"/>
-          </a:p>
-        </p:txBody>
-      </p:sp>
-      <p:pic>
-        <p:nvPicPr>
-          <p:cNvPr id="6" name="Imagem 5" descr="Tela de celular com texto preto sobre fundo branco&#10;&#10;Descrição gerada automaticamente">
-            <a:extLst>
-              <a:ext uri="{FF2B5EF4-FFF2-40B4-BE49-F238E27FC236}">
-                <a16:creationId xmlns:a16="http://schemas.microsoft.com/office/drawing/2014/main" id="{57E15E8F-6A3F-49A7-929E-BEF7851319B1}"/>
-              </a:ext>
-            </a:extLst>
-          </p:cNvPr>
-          <p:cNvPicPr>
-            <a:picLocks noChangeAspect="1"/>
-          </p:cNvPicPr>
-          <p:nvPr/>
-        </p:nvPicPr>
-        <p:blipFill>
-          <a:blip r:embed="rId3"/>
-          <a:stretch>
-            <a:fillRect/>
-          </a:stretch>
-        </p:blipFill>
-        <p:spPr>
-          <a:xfrm>
-            <a:off x="2122108" y="357288"/>
-            <a:ext cx="2329681" cy="1065828"/>
-          </a:xfrm>
-          <a:prstGeom prst="rect">
-            <a:avLst/>
-          </a:prstGeom>
-        </p:spPr>
-      </p:pic>
-      <p:sp>
-        <p:nvSpPr>
-          <p:cNvPr id="24" name="Freeform 72">
-            <a:extLst>
-              <a:ext uri="{FF2B5EF4-FFF2-40B4-BE49-F238E27FC236}">
-                <a16:creationId xmlns:a16="http://schemas.microsoft.com/office/drawing/2014/main" id="{5AFEC34A-0251-411C-A0C7-E1FB917E90B5}"/>
-              </a:ext>
-              <a:ext uri="{C183D7F6-B498-43B3-948B-1728B52AA6E4}">
-                <adec:decorative xmlns:adec="http://schemas.microsoft.com/office/drawing/2017/decorative" val="1"/>
-              </a:ext>
-            </a:extLst>
-          </p:cNvPr>
-          <p:cNvSpPr>
-            <a:spLocks noGrp="1" noRot="1" noChangeAspect="1" noMove="1" noResize="1" noEditPoints="1" noAdjustHandles="1" noChangeArrowheads="1" noChangeShapeType="1" noTextEdit="1"/>
-          </p:cNvSpPr>
-          <p:nvPr>
-            <p:extLst>
-              <p:ext uri="{386F3935-93C4-4BCD-93E2-E3B085C9AB24}">
-                <p16:designElem xmlns:p16="http://schemas.microsoft.com/office/powerpoint/2015/main" val="1"/>
-              </p:ext>
-            </p:extLst>
-          </p:nvPr>
-        </p:nvSpPr>
-        <p:spPr>
-          <a:xfrm>
-            <a:off x="1" y="2433009"/>
-            <a:ext cx="3762321" cy="4434467"/>
-          </a:xfrm>
-          <a:custGeom>
-            <a:avLst/>
-            <a:gdLst>
-              <a:gd name="connsiteX0" fmla="*/ 871484 w 3762321"/>
-              <a:gd name="connsiteY0" fmla="*/ 0 h 4434467"/>
-              <a:gd name="connsiteX1" fmla="*/ 3762321 w 3762321"/>
-              <a:gd name="connsiteY1" fmla="*/ 2890836 h 4434467"/>
-              <a:gd name="connsiteX2" fmla="*/ 3413413 w 3762321"/>
-              <a:gd name="connsiteY2" fmla="*/ 4268781 h 4434467"/>
-              <a:gd name="connsiteX3" fmla="*/ 3312756 w 3762321"/>
-              <a:gd name="connsiteY3" fmla="*/ 4434467 h 4434467"/>
-              <a:gd name="connsiteX4" fmla="*/ 0 w 3762321"/>
-              <a:gd name="connsiteY4" fmla="*/ 4434467 h 4434467"/>
-              <a:gd name="connsiteX5" fmla="*/ 0 w 3762321"/>
-              <a:gd name="connsiteY5" fmla="*/ 134299 h 4434467"/>
-              <a:gd name="connsiteX6" fmla="*/ 11838 w 3762321"/>
-              <a:gd name="connsiteY6" fmla="*/ 129967 h 4434467"/>
-              <a:gd name="connsiteX7" fmla="*/ 871484 w 3762321"/>
-              <a:gd name="connsiteY7" fmla="*/ 0 h 4434467"/>
+              <a:gd name="connsiteX0" fmla="*/ 640080 w 3730752"/>
+              <a:gd name="connsiteY0" fmla="*/ 0 h 4735782"/>
+              <a:gd name="connsiteX1" fmla="*/ 3730752 w 3730752"/>
+              <a:gd name="connsiteY1" fmla="*/ 3090672 h 4735782"/>
+              <a:gd name="connsiteX2" fmla="*/ 3357725 w 3730752"/>
+              <a:gd name="connsiteY2" fmla="*/ 4563870 h 4735782"/>
+              <a:gd name="connsiteX3" fmla="*/ 3253285 w 3730752"/>
+              <a:gd name="connsiteY3" fmla="*/ 4735782 h 4735782"/>
+              <a:gd name="connsiteX4" fmla="*/ 0 w 3730752"/>
+              <a:gd name="connsiteY4" fmla="*/ 4735782 h 4735782"/>
+              <a:gd name="connsiteX5" fmla="*/ 0 w 3730752"/>
+              <a:gd name="connsiteY5" fmla="*/ 67215 h 4735782"/>
+              <a:gd name="connsiteX6" fmla="*/ 17202 w 3730752"/>
+              <a:gd name="connsiteY6" fmla="*/ 62792 h 4735782"/>
+              <a:gd name="connsiteX7" fmla="*/ 640080 w 3730752"/>
+              <a:gd name="connsiteY7" fmla="*/ 0 h 4735782"/>
             </a:gdLst>
             <a:ahLst/>
             <a:cxnLst>
@@ -4112,72 +3933,48 @@
             </a:cxnLst>
             <a:rect l="l" t="t" r="r" b="b"/>
             <a:pathLst>
-              <a:path w="3762321" h="4434467">
+              <a:path w="3730752" h="4735782">
                 <a:moveTo>
-                  <a:pt x="871484" y="0"/>
+                  <a:pt x="640080" y="0"/>
                 </a:moveTo>
                 <a:cubicBezTo>
-                  <a:pt x="2468049" y="0"/>
-                  <a:pt x="3762321" y="1294271"/>
-                  <a:pt x="3762321" y="2890836"/>
+                  <a:pt x="2347011" y="0"/>
+                  <a:pt x="3730752" y="1383741"/>
+                  <a:pt x="3730752" y="3090672"/>
                 </a:cubicBezTo>
                 <a:cubicBezTo>
-                  <a:pt x="3762321" y="3389763"/>
-                  <a:pt x="3635928" y="3859169"/>
-                  <a:pt x="3413413" y="4268781"/>
+                  <a:pt x="3730752" y="3624088"/>
+                  <a:pt x="3595621" y="4125943"/>
+                  <a:pt x="3357725" y="4563870"/>
                 </a:cubicBezTo>
                 <a:lnTo>
-                  <a:pt x="3312756" y="4434467"/>
+                  <a:pt x="3253285" y="4735782"/>
                 </a:lnTo>
                 <a:lnTo>
-                  <a:pt x="0" y="4434467"/>
+                  <a:pt x="0" y="4735782"/>
                 </a:lnTo>
                 <a:lnTo>
-                  <a:pt x="0" y="134299"/>
+                  <a:pt x="0" y="67215"/>
                 </a:lnTo>
                 <a:lnTo>
-                  <a:pt x="11838" y="129967"/>
+                  <a:pt x="17202" y="62792"/>
                 </a:lnTo>
                 <a:cubicBezTo>
-                  <a:pt x="283400" y="45502"/>
-                  <a:pt x="572129" y="0"/>
-                  <a:pt x="871484" y="0"/>
+                  <a:pt x="218397" y="21621"/>
+                  <a:pt x="426714" y="0"/>
+                  <a:pt x="640080" y="0"/>
                 </a:cubicBezTo>
                 <a:close/>
               </a:path>
             </a:pathLst>
           </a:custGeom>
           <a:solidFill>
-            <a:srgbClr val="FFFFFF"/>
+            <a:srgbClr val="FFFFFF">
+              <a:alpha val="80000"/>
+            </a:srgbClr>
           </a:solidFill>
           <a:ln>
-            <a:gradFill>
-              <a:gsLst>
-                <a:gs pos="0">
-                  <a:schemeClr val="accent1">
-                    <a:lumMod val="40000"/>
-                    <a:lumOff val="60000"/>
-                  </a:schemeClr>
-                </a:gs>
-                <a:gs pos="23000">
-                  <a:schemeClr val="accent1">
-                    <a:lumMod val="45000"/>
-                    <a:lumOff val="55000"/>
-                  </a:schemeClr>
-                </a:gs>
-                <a:gs pos="83000">
-                  <a:schemeClr val="bg2">
-                    <a:lumMod val="75000"/>
-                  </a:schemeClr>
-                </a:gs>
-                <a:gs pos="100000">
-                  <a:schemeClr val="bg2">
-                    <a:lumMod val="75000"/>
-                  </a:schemeClr>
-                </a:gs>
-              </a:gsLst>
-              <a:lin ang="5400000" scaled="1"/>
-            </a:gradFill>
+            <a:noFill/>
           </a:ln>
         </p:spPr>
         <p:style>
@@ -4202,17 +3999,46 @@
           </a:bodyPr>
           <a:lstStyle/>
           <a:p>
-            <a:pPr algn="ctr"/>
-            <a:endParaRPr lang="en-US"/>
-          </a:p>
-        </p:txBody>
-      </p:sp>
-      <p:sp>
-        <p:nvSpPr>
-          <p:cNvPr id="26" name="Oval 25">
+            <a:pPr marL="0" marR="0" lvl="0" indent="0" algn="ctr" defTabSz="914400" rtl="0" eaLnBrk="1" fontAlgn="auto" latinLnBrk="0" hangingPunct="1">
+              <a:lnSpc>
+                <a:spcPct val="100000"/>
+              </a:lnSpc>
+              <a:spcBef>
+                <a:spcPts val="0"/>
+              </a:spcBef>
+              <a:spcAft>
+                <a:spcPts val="0"/>
+              </a:spcAft>
+              <a:buClrTx/>
+              <a:buSzTx/>
+              <a:buFontTx/>
+              <a:buNone/>
+              <a:tabLst/>
+              <a:defRPr/>
+            </a:pPr>
+            <a:endParaRPr kumimoji="0" lang="en-US" sz="1800" b="0" i="0" u="none" strike="noStrike" kern="1200" cap="none" spc="0" normalizeH="0" baseline="0" noProof="0">
+              <a:ln>
+                <a:noFill/>
+              </a:ln>
+              <a:solidFill>
+                <a:prstClr val="white"/>
+              </a:solidFill>
+              <a:effectLst/>
+              <a:uLnTx/>
+              <a:uFillTx/>
+              <a:latin typeface="Calibri" panose="020F0502020204030204"/>
+              <a:ea typeface="+mn-ea"/>
+              <a:cs typeface="+mn-cs"/>
+            </a:endParaRPr>
+          </a:p>
+        </p:txBody>
+      </p:sp>
+      <p:sp>
+        <p:nvSpPr>
+          <p:cNvPr id="37" name="Freeform: Shape 36">
             <a:extLst>
               <a:ext uri="{FF2B5EF4-FFF2-40B4-BE49-F238E27FC236}">
-                <a16:creationId xmlns:a16="http://schemas.microsoft.com/office/drawing/2014/main" id="{89E9B1A9-F407-4A46-B721-26946A1A2CC8}"/>
+                <a16:creationId xmlns:a16="http://schemas.microsoft.com/office/drawing/2014/main" id="{9DBC4630-03DA-474F-BBCB-BA3AE6B317A4}"/>
               </a:ext>
               <a:ext uri="{C183D7F6-B498-43B3-948B-1728B52AA6E4}">
                 <adec:decorative xmlns:adec="http://schemas.microsoft.com/office/drawing/2017/decorative" val="1"/>
@@ -4232,145 +4058,26 @@
         </p:nvSpPr>
         <p:spPr>
           <a:xfrm>
-            <a:off x="5221460" y="460823"/>
-            <a:ext cx="3245896" cy="3245896"/>
-          </a:xfrm>
-          <a:prstGeom prst="ellipse">
-            <a:avLst/>
-          </a:prstGeom>
-          <a:solidFill>
-            <a:srgbClr val="FFFFFF"/>
-          </a:solidFill>
-          <a:ln>
-            <a:gradFill>
-              <a:gsLst>
-                <a:gs pos="0">
-                  <a:schemeClr val="accent1">
-                    <a:lumMod val="40000"/>
-                    <a:lumOff val="60000"/>
-                  </a:schemeClr>
-                </a:gs>
-                <a:gs pos="23000">
-                  <a:schemeClr val="accent1">
-                    <a:lumMod val="45000"/>
-                    <a:lumOff val="55000"/>
-                  </a:schemeClr>
-                </a:gs>
-                <a:gs pos="83000">
-                  <a:schemeClr val="bg2">
-                    <a:lumMod val="75000"/>
-                  </a:schemeClr>
-                </a:gs>
-                <a:gs pos="100000">
-                  <a:schemeClr val="bg2">
-                    <a:lumMod val="75000"/>
-                  </a:schemeClr>
-                </a:gs>
-              </a:gsLst>
-              <a:lin ang="5400000" scaled="1"/>
-            </a:gradFill>
-          </a:ln>
-        </p:spPr>
-        <p:style>
-          <a:lnRef idx="2">
-            <a:schemeClr val="accent1">
-              <a:shade val="50000"/>
-            </a:schemeClr>
-          </a:lnRef>
-          <a:fillRef idx="1">
-            <a:schemeClr val="accent1"/>
-          </a:fillRef>
-          <a:effectRef idx="0">
-            <a:schemeClr val="accent1"/>
-          </a:effectRef>
-          <a:fontRef idx="minor">
-            <a:schemeClr val="lt1"/>
-          </a:fontRef>
-        </p:style>
-        <p:txBody>
-          <a:bodyPr rtlCol="0" anchor="ctr"/>
-          <a:lstStyle/>
-          <a:p>
-            <a:pPr algn="ctr"/>
-            <a:endParaRPr lang="en-US"/>
-          </a:p>
-        </p:txBody>
-      </p:sp>
-      <p:pic>
-        <p:nvPicPr>
-          <p:cNvPr id="9" name="Imagem 8" descr="Uma imagem contendo texto, desenho, placar, placa&#10;&#10;Descrição gerada automaticamente">
-            <a:extLst>
-              <a:ext uri="{FF2B5EF4-FFF2-40B4-BE49-F238E27FC236}">
-                <a16:creationId xmlns:a16="http://schemas.microsoft.com/office/drawing/2014/main" id="{C251AD62-1E4A-48F8-A2CC-10A01D1216BC}"/>
-              </a:ext>
-            </a:extLst>
-          </p:cNvPr>
-          <p:cNvPicPr>
-            <a:picLocks noChangeAspect="1"/>
-          </p:cNvPicPr>
-          <p:nvPr/>
-        </p:nvPicPr>
-        <p:blipFill>
-          <a:blip r:embed="rId4"/>
-          <a:stretch>
-            <a:fillRect/>
-          </a:stretch>
-        </p:blipFill>
-        <p:spPr>
-          <a:xfrm>
-            <a:off x="5725050" y="1529000"/>
-            <a:ext cx="2254110" cy="1127055"/>
-          </a:xfrm>
-          <a:prstGeom prst="rect">
-            <a:avLst/>
-          </a:prstGeom>
-        </p:spPr>
-      </p:pic>
-      <p:sp>
-        <p:nvSpPr>
-          <p:cNvPr id="28" name="Freeform 64">
-            <a:extLst>
-              <a:ext uri="{FF2B5EF4-FFF2-40B4-BE49-F238E27FC236}">
-                <a16:creationId xmlns:a16="http://schemas.microsoft.com/office/drawing/2014/main" id="{B81747D3-9737-4919-8850-65DBC9048B92}"/>
-              </a:ext>
-              <a:ext uri="{C183D7F6-B498-43B3-948B-1728B52AA6E4}">
-                <adec:decorative xmlns:adec="http://schemas.microsoft.com/office/drawing/2017/decorative" val="1"/>
-              </a:ext>
-            </a:extLst>
-          </p:cNvPr>
-          <p:cNvSpPr>
-            <a:spLocks noGrp="1" noRot="1" noChangeAspect="1" noMove="1" noResize="1" noEditPoints="1" noAdjustHandles="1" noChangeArrowheads="1" noChangeShapeType="1" noTextEdit="1"/>
-          </p:cNvSpPr>
-          <p:nvPr>
-            <p:extLst>
-              <p:ext uri="{386F3935-93C4-4BCD-93E2-E3B085C9AB24}">
-                <p16:designElem xmlns:p16="http://schemas.microsoft.com/office/powerpoint/2015/main" val="1"/>
-              </p:ext>
-            </p:extLst>
-          </p:nvPr>
-        </p:nvSpPr>
-        <p:spPr>
-          <a:xfrm>
-            <a:off x="9098288" y="1"/>
-            <a:ext cx="3093713" cy="3406036"/>
+            <a:off x="1081982" y="-4332"/>
+            <a:ext cx="4242816" cy="2454158"/>
           </a:xfrm>
           <a:custGeom>
             <a:avLst/>
             <a:gdLst>
-              <a:gd name="connsiteX0" fmla="*/ 404583 w 3093713"/>
-              <a:gd name="connsiteY0" fmla="*/ 0 h 3406036"/>
-              <a:gd name="connsiteX1" fmla="*/ 3093713 w 3093713"/>
-              <a:gd name="connsiteY1" fmla="*/ 0 h 3406036"/>
-              <a:gd name="connsiteX2" fmla="*/ 3093713 w 3093713"/>
-              <a:gd name="connsiteY2" fmla="*/ 3187362 h 3406036"/>
-              <a:gd name="connsiteX3" fmla="*/ 2990991 w 3093713"/>
-              <a:gd name="connsiteY3" fmla="*/ 3236846 h 3406036"/>
-              <a:gd name="connsiteX4" fmla="*/ 2152961 w 3093713"/>
-              <a:gd name="connsiteY4" fmla="*/ 3406036 h 3406036"/>
-              <a:gd name="connsiteX5" fmla="*/ 0 w 3093713"/>
-              <a:gd name="connsiteY5" fmla="*/ 1253075 h 3406036"/>
-              <a:gd name="connsiteX6" fmla="*/ 367692 w 3093713"/>
-              <a:gd name="connsiteY6" fmla="*/ 49334 h 3406036"/>
+              <a:gd name="connsiteX0" fmla="*/ 28633 w 4242816"/>
+              <a:gd name="connsiteY0" fmla="*/ 0 h 2454158"/>
+              <a:gd name="connsiteX1" fmla="*/ 4214183 w 4242816"/>
+              <a:gd name="connsiteY1" fmla="*/ 0 h 2454158"/>
+              <a:gd name="connsiteX2" fmla="*/ 4231864 w 4242816"/>
+              <a:gd name="connsiteY2" fmla="*/ 115848 h 2454158"/>
+              <a:gd name="connsiteX3" fmla="*/ 4242816 w 4242816"/>
+              <a:gd name="connsiteY3" fmla="*/ 332750 h 2454158"/>
+              <a:gd name="connsiteX4" fmla="*/ 2121408 w 4242816"/>
+              <a:gd name="connsiteY4" fmla="*/ 2454158 h 2454158"/>
+              <a:gd name="connsiteX5" fmla="*/ 0 w 4242816"/>
+              <a:gd name="connsiteY5" fmla="*/ 332750 h 2454158"/>
+              <a:gd name="connsiteX6" fmla="*/ 10953 w 4242816"/>
+              <a:gd name="connsiteY6" fmla="*/ 115848 h 2454158"/>
             </a:gdLst>
             <a:ahLst/>
             <a:cxnLst>
@@ -4398,69 +4105,47 @@
             </a:cxnLst>
             <a:rect l="l" t="t" r="r" b="b"/>
             <a:pathLst>
-              <a:path w="3093713" h="3406036">
+              <a:path w="4242816" h="2454158">
                 <a:moveTo>
-                  <a:pt x="404583" y="0"/>
+                  <a:pt x="28633" y="0"/>
                 </a:moveTo>
                 <a:lnTo>
-                  <a:pt x="3093713" y="0"/>
+                  <a:pt x="4214183" y="0"/>
                 </a:lnTo>
                 <a:lnTo>
-                  <a:pt x="3093713" y="3187362"/>
-                </a:lnTo>
-                <a:lnTo>
-                  <a:pt x="2990991" y="3236846"/>
+                  <a:pt x="4231864" y="115848"/>
                 </a:lnTo>
                 <a:cubicBezTo>
-                  <a:pt x="2733414" y="3345792"/>
-                  <a:pt x="2450223" y="3406036"/>
-                  <a:pt x="2152961" y="3406036"/>
+                  <a:pt x="4239106" y="187164"/>
+                  <a:pt x="4242816" y="259524"/>
+                  <a:pt x="4242816" y="332750"/>
                 </a:cubicBezTo>
                 <a:cubicBezTo>
-                  <a:pt x="963913" y="3406036"/>
-                  <a:pt x="0" y="2442123"/>
-                  <a:pt x="0" y="1253075"/>
+                  <a:pt x="4242816" y="1504371"/>
+                  <a:pt x="3293029" y="2454158"/>
+                  <a:pt x="2121408" y="2454158"/>
                 </a:cubicBezTo>
                 <a:cubicBezTo>
-                  <a:pt x="0" y="807182"/>
-                  <a:pt x="135550" y="392949"/>
-                  <a:pt x="367692" y="49334"/>
+                  <a:pt x="949787" y="2454158"/>
+                  <a:pt x="0" y="1504371"/>
+                  <a:pt x="0" y="332750"/>
+                </a:cubicBezTo>
+                <a:cubicBezTo>
+                  <a:pt x="0" y="259524"/>
+                  <a:pt x="3710" y="187164"/>
+                  <a:pt x="10953" y="115848"/>
                 </a:cubicBezTo>
                 <a:close/>
               </a:path>
             </a:pathLst>
           </a:custGeom>
           <a:solidFill>
-            <a:srgbClr val="FFFFFF"/>
+            <a:srgbClr val="FFFFFF">
+              <a:alpha val="80000"/>
+            </a:srgbClr>
           </a:solidFill>
           <a:ln>
-            <a:gradFill>
-              <a:gsLst>
-                <a:gs pos="0">
-                  <a:schemeClr val="accent1">
-                    <a:lumMod val="40000"/>
-                    <a:lumOff val="60000"/>
-                  </a:schemeClr>
-                </a:gs>
-                <a:gs pos="23000">
-                  <a:schemeClr val="accent1">
-                    <a:lumMod val="45000"/>
-                    <a:lumOff val="55000"/>
-                  </a:schemeClr>
-                </a:gs>
-                <a:gs pos="83000">
-                  <a:schemeClr val="bg2">
-                    <a:lumMod val="75000"/>
-                  </a:schemeClr>
-                </a:gs>
-                <a:gs pos="100000">
-                  <a:schemeClr val="bg2">
-                    <a:lumMod val="75000"/>
-                  </a:schemeClr>
-                </a:gs>
-              </a:gsLst>
-              <a:lin ang="5400000" scaled="1"/>
-            </a:gradFill>
+            <a:noFill/>
           </a:ln>
         </p:spPr>
         <p:style>
@@ -4485,6 +4170,693 @@
           </a:bodyPr>
           <a:lstStyle/>
           <a:p>
+            <a:pPr marL="0" marR="0" lvl="0" indent="0" algn="ctr" defTabSz="914400" rtl="0" eaLnBrk="1" fontAlgn="auto" latinLnBrk="0" hangingPunct="1">
+              <a:lnSpc>
+                <a:spcPct val="100000"/>
+              </a:lnSpc>
+              <a:spcBef>
+                <a:spcPts val="0"/>
+              </a:spcBef>
+              <a:spcAft>
+                <a:spcPts val="0"/>
+              </a:spcAft>
+              <a:buClrTx/>
+              <a:buSzTx/>
+              <a:buFontTx/>
+              <a:buNone/>
+              <a:tabLst/>
+              <a:defRPr/>
+            </a:pPr>
+            <a:endParaRPr kumimoji="0" lang="en-US" sz="1800" b="0" i="0" u="none" strike="noStrike" kern="1200" cap="none" spc="0" normalizeH="0" baseline="0" noProof="0">
+              <a:ln>
+                <a:noFill/>
+              </a:ln>
+              <a:solidFill>
+                <a:prstClr val="white"/>
+              </a:solidFill>
+              <a:effectLst/>
+              <a:uLnTx/>
+              <a:uFillTx/>
+              <a:latin typeface="Calibri" panose="020F0502020204030204"/>
+              <a:ea typeface="+mn-ea"/>
+              <a:cs typeface="+mn-cs"/>
+            </a:endParaRPr>
+          </a:p>
+        </p:txBody>
+      </p:sp>
+      <p:sp>
+        <p:nvSpPr>
+          <p:cNvPr id="39" name="Freeform: Shape 38">
+            <a:extLst>
+              <a:ext uri="{FF2B5EF4-FFF2-40B4-BE49-F238E27FC236}">
+                <a16:creationId xmlns:a16="http://schemas.microsoft.com/office/drawing/2014/main" id="{DB6FE6A8-3E05-4C40-9190-B19BFD524416}"/>
+              </a:ext>
+              <a:ext uri="{C183D7F6-B498-43B3-948B-1728B52AA6E4}">
+                <adec:decorative xmlns:adec="http://schemas.microsoft.com/office/drawing/2017/decorative" val="1"/>
+              </a:ext>
+            </a:extLst>
+          </p:cNvPr>
+          <p:cNvSpPr>
+            <a:spLocks noGrp="1" noRot="1" noChangeAspect="1" noMove="1" noResize="1" noEditPoints="1" noAdjustHandles="1" noChangeArrowheads="1" noChangeShapeType="1" noTextEdit="1"/>
+          </p:cNvSpPr>
+          <p:nvPr>
+            <p:extLst>
+              <p:ext uri="{386F3935-93C4-4BCD-93E2-E3B085C9AB24}">
+                <p16:designElem xmlns:p16="http://schemas.microsoft.com/office/powerpoint/2015/main" val="1"/>
+              </p:ext>
+            </p:extLst>
+          </p:nvPr>
+        </p:nvSpPr>
+        <p:spPr>
+          <a:xfrm>
+            <a:off x="1246574" y="0"/>
+            <a:ext cx="3913632" cy="2285234"/>
+          </a:xfrm>
+          <a:custGeom>
+            <a:avLst/>
+            <a:gdLst>
+              <a:gd name="connsiteX0" fmla="*/ 29691 w 3913632"/>
+              <a:gd name="connsiteY0" fmla="*/ 0 h 2285234"/>
+              <a:gd name="connsiteX1" fmla="*/ 3883942 w 3913632"/>
+              <a:gd name="connsiteY1" fmla="*/ 0 h 2285234"/>
+              <a:gd name="connsiteX2" fmla="*/ 3903529 w 3913632"/>
+              <a:gd name="connsiteY2" fmla="*/ 128345 h 2285234"/>
+              <a:gd name="connsiteX3" fmla="*/ 3913632 w 3913632"/>
+              <a:gd name="connsiteY3" fmla="*/ 328418 h 2285234"/>
+              <a:gd name="connsiteX4" fmla="*/ 1956816 w 3913632"/>
+              <a:gd name="connsiteY4" fmla="*/ 2285234 h 2285234"/>
+              <a:gd name="connsiteX5" fmla="*/ 0 w 3913632"/>
+              <a:gd name="connsiteY5" fmla="*/ 328418 h 2285234"/>
+              <a:gd name="connsiteX6" fmla="*/ 10103 w 3913632"/>
+              <a:gd name="connsiteY6" fmla="*/ 128345 h 2285234"/>
+            </a:gdLst>
+            <a:ahLst/>
+            <a:cxnLst>
+              <a:cxn ang="0">
+                <a:pos x="connsiteX0" y="connsiteY0"/>
+              </a:cxn>
+              <a:cxn ang="0">
+                <a:pos x="connsiteX1" y="connsiteY1"/>
+              </a:cxn>
+              <a:cxn ang="0">
+                <a:pos x="connsiteX2" y="connsiteY2"/>
+              </a:cxn>
+              <a:cxn ang="0">
+                <a:pos x="connsiteX3" y="connsiteY3"/>
+              </a:cxn>
+              <a:cxn ang="0">
+                <a:pos x="connsiteX4" y="connsiteY4"/>
+              </a:cxn>
+              <a:cxn ang="0">
+                <a:pos x="connsiteX5" y="connsiteY5"/>
+              </a:cxn>
+              <a:cxn ang="0">
+                <a:pos x="connsiteX6" y="connsiteY6"/>
+              </a:cxn>
+            </a:cxnLst>
+            <a:rect l="l" t="t" r="r" b="b"/>
+            <a:pathLst>
+              <a:path w="3913632" h="2285234">
+                <a:moveTo>
+                  <a:pt x="29691" y="0"/>
+                </a:moveTo>
+                <a:lnTo>
+                  <a:pt x="3883942" y="0"/>
+                </a:lnTo>
+                <a:lnTo>
+                  <a:pt x="3903529" y="128345"/>
+                </a:lnTo>
+                <a:cubicBezTo>
+                  <a:pt x="3910210" y="194127"/>
+                  <a:pt x="3913632" y="260873"/>
+                  <a:pt x="3913632" y="328418"/>
+                </a:cubicBezTo>
+                <a:cubicBezTo>
+                  <a:pt x="3913632" y="1409138"/>
+                  <a:pt x="3037536" y="2285234"/>
+                  <a:pt x="1956816" y="2285234"/>
+                </a:cubicBezTo>
+                <a:cubicBezTo>
+                  <a:pt x="876096" y="2285234"/>
+                  <a:pt x="0" y="1409138"/>
+                  <a:pt x="0" y="328418"/>
+                </a:cubicBezTo>
+                <a:cubicBezTo>
+                  <a:pt x="0" y="260873"/>
+                  <a:pt x="3422" y="194127"/>
+                  <a:pt x="10103" y="128345"/>
+                </a:cubicBezTo>
+                <a:close/>
+              </a:path>
+            </a:pathLst>
+          </a:custGeom>
+          <a:solidFill>
+            <a:schemeClr val="tx1"/>
+          </a:solidFill>
+          <a:ln>
+            <a:noFill/>
+          </a:ln>
+        </p:spPr>
+        <p:style>
+          <a:lnRef idx="2">
+            <a:schemeClr val="accent1">
+              <a:shade val="50000"/>
+            </a:schemeClr>
+          </a:lnRef>
+          <a:fillRef idx="1">
+            <a:schemeClr val="accent1"/>
+          </a:fillRef>
+          <a:effectRef idx="0">
+            <a:schemeClr val="accent1"/>
+          </a:effectRef>
+          <a:fontRef idx="minor">
+            <a:schemeClr val="lt1"/>
+          </a:fontRef>
+        </p:style>
+        <p:txBody>
+          <a:bodyPr wrap="square" rtlCol="0" anchor="ctr">
+            <a:noAutofit/>
+          </a:bodyPr>
+          <a:lstStyle/>
+          <a:p>
+            <a:pPr algn="ctr"/>
+            <a:endParaRPr lang="en-US"/>
+          </a:p>
+        </p:txBody>
+      </p:sp>
+      <p:pic>
+        <p:nvPicPr>
+          <p:cNvPr id="13" name="Imagem 12" descr="Uma imagem contendo placar, relógio, desenho&#10;&#10;Descrição gerada automaticamente">
+            <a:extLst>
+              <a:ext uri="{FF2B5EF4-FFF2-40B4-BE49-F238E27FC236}">
+                <a16:creationId xmlns:a16="http://schemas.microsoft.com/office/drawing/2014/main" id="{61063035-9EDF-4602-AD2D-60CA866CD45E}"/>
+              </a:ext>
+            </a:extLst>
+          </p:cNvPr>
+          <p:cNvPicPr>
+            <a:picLocks noChangeAspect="1"/>
+          </p:cNvPicPr>
+          <p:nvPr/>
+        </p:nvPicPr>
+        <p:blipFill>
+          <a:blip r:embed="rId2"/>
+          <a:stretch>
+            <a:fillRect/>
+          </a:stretch>
+        </p:blipFill>
+        <p:spPr>
+          <a:xfrm>
+            <a:off x="2157535" y="551153"/>
+            <a:ext cx="2091710" cy="894205"/>
+          </a:xfrm>
+          <a:prstGeom prst="rect">
+            <a:avLst/>
+          </a:prstGeom>
+        </p:spPr>
+      </p:pic>
+      <p:sp>
+        <p:nvSpPr>
+          <p:cNvPr id="41" name="Freeform: Shape 40">
+            <a:extLst>
+              <a:ext uri="{FF2B5EF4-FFF2-40B4-BE49-F238E27FC236}">
+                <a16:creationId xmlns:a16="http://schemas.microsoft.com/office/drawing/2014/main" id="{38315451-BA4E-4F56-BA8A-9CCCA5A0DC22}"/>
+              </a:ext>
+              <a:ext uri="{C183D7F6-B498-43B3-948B-1728B52AA6E4}">
+                <adec:decorative xmlns:adec="http://schemas.microsoft.com/office/drawing/2017/decorative" val="1"/>
+              </a:ext>
+            </a:extLst>
+          </p:cNvPr>
+          <p:cNvSpPr>
+            <a:spLocks noGrp="1" noRot="1" noChangeAspect="1" noMove="1" noResize="1" noEditPoints="1" noAdjustHandles="1" noChangeArrowheads="1" noChangeShapeType="1" noTextEdit="1"/>
+          </p:cNvSpPr>
+          <p:nvPr>
+            <p:extLst>
+              <p:ext uri="{386F3935-93C4-4BCD-93E2-E3B085C9AB24}">
+                <p16:designElem xmlns:p16="http://schemas.microsoft.com/office/powerpoint/2015/main" val="1"/>
+              </p:ext>
+            </p:extLst>
+          </p:nvPr>
+        </p:nvSpPr>
+        <p:spPr>
+          <a:xfrm>
+            <a:off x="-1" y="2288331"/>
+            <a:ext cx="3564638" cy="4569668"/>
+          </a:xfrm>
+          <a:custGeom>
+            <a:avLst/>
+            <a:gdLst>
+              <a:gd name="connsiteX0" fmla="*/ 640080 w 3564638"/>
+              <a:gd name="connsiteY0" fmla="*/ 0 h 4569668"/>
+              <a:gd name="connsiteX1" fmla="*/ 3564638 w 3564638"/>
+              <a:gd name="connsiteY1" fmla="*/ 2924558 h 4569668"/>
+              <a:gd name="connsiteX2" fmla="*/ 3065170 w 3564638"/>
+              <a:gd name="connsiteY2" fmla="*/ 4559707 h 4569668"/>
+              <a:gd name="connsiteX3" fmla="*/ 3057720 w 3564638"/>
+              <a:gd name="connsiteY3" fmla="*/ 4569668 h 4569668"/>
+              <a:gd name="connsiteX4" fmla="*/ 0 w 3564638"/>
+              <a:gd name="connsiteY4" fmla="*/ 4569668 h 4569668"/>
+              <a:gd name="connsiteX5" fmla="*/ 0 w 3564638"/>
+              <a:gd name="connsiteY5" fmla="*/ 72448 h 4569668"/>
+              <a:gd name="connsiteX6" fmla="*/ 50679 w 3564638"/>
+              <a:gd name="connsiteY6" fmla="*/ 59417 h 4569668"/>
+              <a:gd name="connsiteX7" fmla="*/ 640080 w 3564638"/>
+              <a:gd name="connsiteY7" fmla="*/ 0 h 4569668"/>
+            </a:gdLst>
+            <a:ahLst/>
+            <a:cxnLst>
+              <a:cxn ang="0">
+                <a:pos x="connsiteX0" y="connsiteY0"/>
+              </a:cxn>
+              <a:cxn ang="0">
+                <a:pos x="connsiteX1" y="connsiteY1"/>
+              </a:cxn>
+              <a:cxn ang="0">
+                <a:pos x="connsiteX2" y="connsiteY2"/>
+              </a:cxn>
+              <a:cxn ang="0">
+                <a:pos x="connsiteX3" y="connsiteY3"/>
+              </a:cxn>
+              <a:cxn ang="0">
+                <a:pos x="connsiteX4" y="connsiteY4"/>
+              </a:cxn>
+              <a:cxn ang="0">
+                <a:pos x="connsiteX5" y="connsiteY5"/>
+              </a:cxn>
+              <a:cxn ang="0">
+                <a:pos x="connsiteX6" y="connsiteY6"/>
+              </a:cxn>
+              <a:cxn ang="0">
+                <a:pos x="connsiteX7" y="connsiteY7"/>
+              </a:cxn>
+            </a:cxnLst>
+            <a:rect l="l" t="t" r="r" b="b"/>
+            <a:pathLst>
+              <a:path w="3564638" h="4569668">
+                <a:moveTo>
+                  <a:pt x="640080" y="0"/>
+                </a:moveTo>
+                <a:cubicBezTo>
+                  <a:pt x="2255269" y="0"/>
+                  <a:pt x="3564638" y="1309369"/>
+                  <a:pt x="3564638" y="2924558"/>
+                </a:cubicBezTo>
+                <a:cubicBezTo>
+                  <a:pt x="3564638" y="3530254"/>
+                  <a:pt x="3380508" y="4092944"/>
+                  <a:pt x="3065170" y="4559707"/>
+                </a:cubicBezTo>
+                <a:lnTo>
+                  <a:pt x="3057720" y="4569668"/>
+                </a:lnTo>
+                <a:lnTo>
+                  <a:pt x="0" y="4569668"/>
+                </a:lnTo>
+                <a:lnTo>
+                  <a:pt x="0" y="72448"/>
+                </a:lnTo>
+                <a:lnTo>
+                  <a:pt x="50679" y="59417"/>
+                </a:lnTo>
+                <a:cubicBezTo>
+                  <a:pt x="241061" y="20459"/>
+                  <a:pt x="438181" y="0"/>
+                  <a:pt x="640080" y="0"/>
+                </a:cubicBezTo>
+                <a:close/>
+              </a:path>
+            </a:pathLst>
+          </a:custGeom>
+          <a:solidFill>
+            <a:schemeClr val="tx1"/>
+          </a:solidFill>
+          <a:ln>
+            <a:noFill/>
+          </a:ln>
+        </p:spPr>
+        <p:style>
+          <a:lnRef idx="2">
+            <a:schemeClr val="accent1">
+              <a:shade val="50000"/>
+            </a:schemeClr>
+          </a:lnRef>
+          <a:fillRef idx="1">
+            <a:schemeClr val="accent1"/>
+          </a:fillRef>
+          <a:effectRef idx="0">
+            <a:schemeClr val="accent1"/>
+          </a:effectRef>
+          <a:fontRef idx="minor">
+            <a:schemeClr val="lt1"/>
+          </a:fontRef>
+        </p:style>
+        <p:txBody>
+          <a:bodyPr wrap="square" rtlCol="0" anchor="ctr">
+            <a:noAutofit/>
+          </a:bodyPr>
+          <a:lstStyle/>
+          <a:p>
+            <a:pPr algn="ctr"/>
+            <a:endParaRPr lang="en-US"/>
+          </a:p>
+        </p:txBody>
+      </p:sp>
+      <p:sp>
+        <p:nvSpPr>
+          <p:cNvPr id="43" name="Freeform: Shape 42">
+            <a:extLst>
+              <a:ext uri="{FF2B5EF4-FFF2-40B4-BE49-F238E27FC236}">
+                <a16:creationId xmlns:a16="http://schemas.microsoft.com/office/drawing/2014/main" id="{5665E03E-3504-4366-BFC7-0CDEDC637069}"/>
+              </a:ext>
+              <a:ext uri="{C183D7F6-B498-43B3-948B-1728B52AA6E4}">
+                <adec:decorative xmlns:adec="http://schemas.microsoft.com/office/drawing/2017/decorative" val="1"/>
+              </a:ext>
+            </a:extLst>
+          </p:cNvPr>
+          <p:cNvSpPr>
+            <a:spLocks noGrp="1" noRot="1" noChangeAspect="1" noMove="1" noResize="1" noEditPoints="1" noAdjustHandles="1" noChangeArrowheads="1" noChangeShapeType="1" noTextEdit="1"/>
+          </p:cNvSpPr>
+          <p:nvPr>
+            <p:extLst>
+              <p:ext uri="{386F3935-93C4-4BCD-93E2-E3B085C9AB24}">
+                <p16:designElem xmlns:p16="http://schemas.microsoft.com/office/powerpoint/2015/main" val="1"/>
+              </p:ext>
+            </p:extLst>
+          </p:nvPr>
+        </p:nvSpPr>
+        <p:spPr>
+          <a:xfrm>
+            <a:off x="3749701" y="2547568"/>
+            <a:ext cx="1591056" cy="1591056"/>
+          </a:xfrm>
+          <a:custGeom>
+            <a:avLst/>
+            <a:gdLst>
+              <a:gd name="connsiteX0" fmla="*/ 795528 w 1591056"/>
+              <a:gd name="connsiteY0" fmla="*/ 0 h 1591056"/>
+              <a:gd name="connsiteX1" fmla="*/ 1591056 w 1591056"/>
+              <a:gd name="connsiteY1" fmla="*/ 795528 h 1591056"/>
+              <a:gd name="connsiteX2" fmla="*/ 795528 w 1591056"/>
+              <a:gd name="connsiteY2" fmla="*/ 1591056 h 1591056"/>
+              <a:gd name="connsiteX3" fmla="*/ 0 w 1591056"/>
+              <a:gd name="connsiteY3" fmla="*/ 795528 h 1591056"/>
+              <a:gd name="connsiteX4" fmla="*/ 795528 w 1591056"/>
+              <a:gd name="connsiteY4" fmla="*/ 0 h 1591056"/>
+            </a:gdLst>
+            <a:ahLst/>
+            <a:cxnLst>
+              <a:cxn ang="0">
+                <a:pos x="connsiteX0" y="connsiteY0"/>
+              </a:cxn>
+              <a:cxn ang="0">
+                <a:pos x="connsiteX1" y="connsiteY1"/>
+              </a:cxn>
+              <a:cxn ang="0">
+                <a:pos x="connsiteX2" y="connsiteY2"/>
+              </a:cxn>
+              <a:cxn ang="0">
+                <a:pos x="connsiteX3" y="connsiteY3"/>
+              </a:cxn>
+              <a:cxn ang="0">
+                <a:pos x="connsiteX4" y="connsiteY4"/>
+              </a:cxn>
+            </a:cxnLst>
+            <a:rect l="l" t="t" r="r" b="b"/>
+            <a:pathLst>
+              <a:path w="1591056" h="1591056">
+                <a:moveTo>
+                  <a:pt x="795528" y="0"/>
+                </a:moveTo>
+                <a:cubicBezTo>
+                  <a:pt x="1234886" y="0"/>
+                  <a:pt x="1591056" y="356170"/>
+                  <a:pt x="1591056" y="795528"/>
+                </a:cubicBezTo>
+                <a:cubicBezTo>
+                  <a:pt x="1591056" y="1234886"/>
+                  <a:pt x="1234886" y="1591056"/>
+                  <a:pt x="795528" y="1591056"/>
+                </a:cubicBezTo>
+                <a:cubicBezTo>
+                  <a:pt x="356170" y="1591056"/>
+                  <a:pt x="0" y="1234886"/>
+                  <a:pt x="0" y="795528"/>
+                </a:cubicBezTo>
+                <a:cubicBezTo>
+                  <a:pt x="0" y="356170"/>
+                  <a:pt x="356170" y="0"/>
+                  <a:pt x="795528" y="0"/>
+                </a:cubicBezTo>
+                <a:close/>
+              </a:path>
+            </a:pathLst>
+          </a:custGeom>
+          <a:solidFill>
+            <a:schemeClr val="tx1"/>
+          </a:solidFill>
+          <a:ln>
+            <a:noFill/>
+          </a:ln>
+        </p:spPr>
+        <p:style>
+          <a:lnRef idx="2">
+            <a:schemeClr val="accent1">
+              <a:shade val="50000"/>
+            </a:schemeClr>
+          </a:lnRef>
+          <a:fillRef idx="1">
+            <a:schemeClr val="accent1"/>
+          </a:fillRef>
+          <a:effectRef idx="0">
+            <a:schemeClr val="accent1"/>
+          </a:effectRef>
+          <a:fontRef idx="minor">
+            <a:schemeClr val="lt1"/>
+          </a:fontRef>
+        </p:style>
+        <p:txBody>
+          <a:bodyPr wrap="square" rtlCol="0" anchor="ctr">
+            <a:noAutofit/>
+          </a:bodyPr>
+          <a:lstStyle/>
+          <a:p>
+            <a:pPr algn="ctr"/>
+            <a:endParaRPr lang="en-US"/>
+          </a:p>
+        </p:txBody>
+      </p:sp>
+      <p:sp>
+        <p:nvSpPr>
+          <p:cNvPr id="45" name="Oval 44">
+            <a:extLst>
+              <a:ext uri="{FF2B5EF4-FFF2-40B4-BE49-F238E27FC236}">
+                <a16:creationId xmlns:a16="http://schemas.microsoft.com/office/drawing/2014/main" id="{78418A25-6EAC-4140-BFE6-284E1925B5EE}"/>
+              </a:ext>
+              <a:ext uri="{C183D7F6-B498-43B3-948B-1728B52AA6E4}">
+                <adec:decorative xmlns:adec="http://schemas.microsoft.com/office/drawing/2017/decorative" val="1"/>
+              </a:ext>
+            </a:extLst>
+          </p:cNvPr>
+          <p:cNvSpPr>
+            <a:spLocks noGrp="1" noRot="1" noChangeAspect="1" noMove="1" noResize="1" noEditPoints="1" noAdjustHandles="1" noChangeArrowheads="1" noChangeShapeType="1" noTextEdit="1"/>
+          </p:cNvSpPr>
+          <p:nvPr>
+            <p:extLst>
+              <p:ext uri="{386F3935-93C4-4BCD-93E2-E3B085C9AB24}">
+                <p16:designElem xmlns:p16="http://schemas.microsoft.com/office/powerpoint/2015/main" val="1"/>
+              </p:ext>
+            </p:extLst>
+          </p:nvPr>
+        </p:nvSpPr>
+        <p:spPr>
+          <a:xfrm>
+            <a:off x="5429207" y="303879"/>
+            <a:ext cx="3182112" cy="3182112"/>
+          </a:xfrm>
+          <a:prstGeom prst="ellipse">
+            <a:avLst/>
+          </a:prstGeom>
+          <a:solidFill>
+            <a:srgbClr val="FFFFFF">
+              <a:alpha val="80000"/>
+            </a:srgbClr>
+          </a:solidFill>
+          <a:ln>
+            <a:noFill/>
+          </a:ln>
+        </p:spPr>
+        <p:style>
+          <a:lnRef idx="2">
+            <a:schemeClr val="accent1">
+              <a:shade val="50000"/>
+            </a:schemeClr>
+          </a:lnRef>
+          <a:fillRef idx="1">
+            <a:schemeClr val="accent1"/>
+          </a:fillRef>
+          <a:effectRef idx="0">
+            <a:schemeClr val="accent1"/>
+          </a:effectRef>
+          <a:fontRef idx="minor">
+            <a:schemeClr val="lt1"/>
+          </a:fontRef>
+        </p:style>
+        <p:txBody>
+          <a:bodyPr rtlCol="0" anchor="ctr"/>
+          <a:lstStyle/>
+          <a:p>
+            <a:pPr marL="0" marR="0" lvl="0" indent="0" algn="ctr" defTabSz="914400" rtl="0" eaLnBrk="1" fontAlgn="auto" latinLnBrk="0" hangingPunct="1">
+              <a:lnSpc>
+                <a:spcPct val="100000"/>
+              </a:lnSpc>
+              <a:spcBef>
+                <a:spcPts val="0"/>
+              </a:spcBef>
+              <a:spcAft>
+                <a:spcPts val="0"/>
+              </a:spcAft>
+              <a:buClrTx/>
+              <a:buSzTx/>
+              <a:buFontTx/>
+              <a:buNone/>
+              <a:tabLst/>
+              <a:defRPr/>
+            </a:pPr>
+            <a:endParaRPr kumimoji="0" lang="en-US" sz="1800" b="0" i="0" u="none" strike="noStrike" kern="1200" cap="none" spc="0" normalizeH="0" baseline="0" noProof="0">
+              <a:ln>
+                <a:noFill/>
+              </a:ln>
+              <a:solidFill>
+                <a:prstClr val="white"/>
+              </a:solidFill>
+              <a:effectLst/>
+              <a:uLnTx/>
+              <a:uFillTx/>
+              <a:latin typeface="Calibri" panose="020F0502020204030204"/>
+              <a:ea typeface="+mn-ea"/>
+              <a:cs typeface="+mn-cs"/>
+            </a:endParaRPr>
+          </a:p>
+        </p:txBody>
+      </p:sp>
+      <p:sp>
+        <p:nvSpPr>
+          <p:cNvPr id="47" name="Freeform: Shape 46">
+            <a:extLst>
+              <a:ext uri="{FF2B5EF4-FFF2-40B4-BE49-F238E27FC236}">
+                <a16:creationId xmlns:a16="http://schemas.microsoft.com/office/drawing/2014/main" id="{A9A95DA0-8F7C-4AB7-B890-22075705D2D3}"/>
+              </a:ext>
+              <a:ext uri="{C183D7F6-B498-43B3-948B-1728B52AA6E4}">
+                <adec:decorative xmlns:adec="http://schemas.microsoft.com/office/drawing/2017/decorative" val="1"/>
+              </a:ext>
+            </a:extLst>
+          </p:cNvPr>
+          <p:cNvSpPr>
+            <a:spLocks noGrp="1" noRot="1" noChangeAspect="1" noMove="1" noResize="1" noEditPoints="1" noAdjustHandles="1" noChangeArrowheads="1" noChangeShapeType="1" noTextEdit="1"/>
+          </p:cNvSpPr>
+          <p:nvPr>
+            <p:extLst>
+              <p:ext uri="{386F3935-93C4-4BCD-93E2-E3B085C9AB24}">
+                <p16:designElem xmlns:p16="http://schemas.microsoft.com/office/powerpoint/2015/main" val="1"/>
+              </p:ext>
+            </p:extLst>
+          </p:nvPr>
+        </p:nvSpPr>
+        <p:spPr>
+          <a:xfrm>
+            <a:off x="5593799" y="468471"/>
+            <a:ext cx="2852928" cy="2852928"/>
+          </a:xfrm>
+          <a:custGeom>
+            <a:avLst/>
+            <a:gdLst>
+              <a:gd name="connsiteX0" fmla="*/ 1426464 w 2852928"/>
+              <a:gd name="connsiteY0" fmla="*/ 0 h 2852928"/>
+              <a:gd name="connsiteX1" fmla="*/ 2852928 w 2852928"/>
+              <a:gd name="connsiteY1" fmla="*/ 1426464 h 2852928"/>
+              <a:gd name="connsiteX2" fmla="*/ 1426464 w 2852928"/>
+              <a:gd name="connsiteY2" fmla="*/ 2852928 h 2852928"/>
+              <a:gd name="connsiteX3" fmla="*/ 0 w 2852928"/>
+              <a:gd name="connsiteY3" fmla="*/ 1426464 h 2852928"/>
+              <a:gd name="connsiteX4" fmla="*/ 1426464 w 2852928"/>
+              <a:gd name="connsiteY4" fmla="*/ 0 h 2852928"/>
+            </a:gdLst>
+            <a:ahLst/>
+            <a:cxnLst>
+              <a:cxn ang="0">
+                <a:pos x="connsiteX0" y="connsiteY0"/>
+              </a:cxn>
+              <a:cxn ang="0">
+                <a:pos x="connsiteX1" y="connsiteY1"/>
+              </a:cxn>
+              <a:cxn ang="0">
+                <a:pos x="connsiteX2" y="connsiteY2"/>
+              </a:cxn>
+              <a:cxn ang="0">
+                <a:pos x="connsiteX3" y="connsiteY3"/>
+              </a:cxn>
+              <a:cxn ang="0">
+                <a:pos x="connsiteX4" y="connsiteY4"/>
+              </a:cxn>
+            </a:cxnLst>
+            <a:rect l="l" t="t" r="r" b="b"/>
+            <a:pathLst>
+              <a:path w="2852928" h="2852928">
+                <a:moveTo>
+                  <a:pt x="1426464" y="0"/>
+                </a:moveTo>
+                <a:cubicBezTo>
+                  <a:pt x="2214278" y="0"/>
+                  <a:pt x="2852928" y="638650"/>
+                  <a:pt x="2852928" y="1426464"/>
+                </a:cubicBezTo>
+                <a:cubicBezTo>
+                  <a:pt x="2852928" y="2214278"/>
+                  <a:pt x="2214278" y="2852928"/>
+                  <a:pt x="1426464" y="2852928"/>
+                </a:cubicBezTo>
+                <a:cubicBezTo>
+                  <a:pt x="638650" y="2852928"/>
+                  <a:pt x="0" y="2214278"/>
+                  <a:pt x="0" y="1426464"/>
+                </a:cubicBezTo>
+                <a:cubicBezTo>
+                  <a:pt x="0" y="638650"/>
+                  <a:pt x="638650" y="0"/>
+                  <a:pt x="1426464" y="0"/>
+                </a:cubicBezTo>
+                <a:close/>
+              </a:path>
+            </a:pathLst>
+          </a:custGeom>
+          <a:solidFill>
+            <a:schemeClr val="tx1"/>
+          </a:solidFill>
+          <a:ln>
+            <a:noFill/>
+          </a:ln>
+        </p:spPr>
+        <p:style>
+          <a:lnRef idx="2">
+            <a:schemeClr val="accent1">
+              <a:shade val="50000"/>
+            </a:schemeClr>
+          </a:lnRef>
+          <a:fillRef idx="1">
+            <a:schemeClr val="accent1"/>
+          </a:fillRef>
+          <a:effectRef idx="0">
+            <a:schemeClr val="accent1"/>
+          </a:effectRef>
+          <a:fontRef idx="minor">
+            <a:schemeClr val="lt1"/>
+          </a:fontRef>
+        </p:style>
+        <p:txBody>
+          <a:bodyPr wrap="square" rtlCol="0" anchor="ctr">
+            <a:noAutofit/>
+          </a:bodyPr>
+          <a:lstStyle/>
+          <a:p>
             <a:pPr algn="ctr"/>
             <a:endParaRPr lang="en-US"/>
           </a:p>
@@ -4505,15 +4877,352 @@
           <p:nvPr/>
         </p:nvPicPr>
         <p:blipFill>
-          <a:blip r:embed="rId5"/>
+          <a:blip r:embed="rId3"/>
           <a:stretch>
             <a:fillRect/>
           </a:stretch>
         </p:blipFill>
         <p:spPr>
           <a:xfrm>
-            <a:off x="9714773" y="906113"/>
-            <a:ext cx="2268558" cy="1155953"/>
+            <a:off x="6130915" y="1441764"/>
+            <a:ext cx="1778697" cy="906342"/>
+          </a:xfrm>
+          <a:prstGeom prst="rect">
+            <a:avLst/>
+          </a:prstGeom>
+        </p:spPr>
+      </p:pic>
+      <p:sp>
+        <p:nvSpPr>
+          <p:cNvPr id="49" name="Freeform: Shape 48">
+            <a:extLst>
+              <a:ext uri="{FF2B5EF4-FFF2-40B4-BE49-F238E27FC236}">
+                <a16:creationId xmlns:a16="http://schemas.microsoft.com/office/drawing/2014/main" id="{6B9D64DB-4D5C-4A91-B45F-F301E3174F9F}"/>
+              </a:ext>
+              <a:ext uri="{C183D7F6-B498-43B3-948B-1728B52AA6E4}">
+                <adec:decorative xmlns:adec="http://schemas.microsoft.com/office/drawing/2017/decorative" val="1"/>
+              </a:ext>
+            </a:extLst>
+          </p:cNvPr>
+          <p:cNvSpPr>
+            <a:spLocks noGrp="1" noRot="1" noChangeAspect="1" noMove="1" noResize="1" noEditPoints="1" noAdjustHandles="1" noChangeArrowheads="1" noChangeShapeType="1" noTextEdit="1"/>
+          </p:cNvSpPr>
+          <p:nvPr>
+            <p:extLst>
+              <p:ext uri="{386F3935-93C4-4BCD-93E2-E3B085C9AB24}">
+                <p16:designElem xmlns:p16="http://schemas.microsoft.com/office/powerpoint/2015/main" val="1"/>
+              </p:ext>
+            </p:extLst>
+          </p:nvPr>
+        </p:nvSpPr>
+        <p:spPr>
+          <a:xfrm>
+            <a:off x="8752568" y="-4332"/>
+            <a:ext cx="3439432" cy="3550083"/>
+          </a:xfrm>
+          <a:custGeom>
+            <a:avLst/>
+            <a:gdLst>
+              <a:gd name="connsiteX0" fmla="*/ 115336 w 3439432"/>
+              <a:gd name="connsiteY0" fmla="*/ 0 h 3550083"/>
+              <a:gd name="connsiteX1" fmla="*/ 3439432 w 3439432"/>
+              <a:gd name="connsiteY1" fmla="*/ 0 h 3550083"/>
+              <a:gd name="connsiteX2" fmla="*/ 3439432 w 3439432"/>
+              <a:gd name="connsiteY2" fmla="*/ 3462762 h 3550083"/>
+              <a:gd name="connsiteX3" fmla="*/ 3318024 w 3439432"/>
+              <a:gd name="connsiteY3" fmla="*/ 3493980 h 3550083"/>
+              <a:gd name="connsiteX4" fmla="*/ 2761488 w 3439432"/>
+              <a:gd name="connsiteY4" fmla="*/ 3550083 h 3550083"/>
+              <a:gd name="connsiteX5" fmla="*/ 0 w 3439432"/>
+              <a:gd name="connsiteY5" fmla="*/ 788595 h 3550083"/>
+              <a:gd name="connsiteX6" fmla="*/ 70713 w 3439432"/>
+              <a:gd name="connsiteY6" fmla="*/ 164949 h 3550083"/>
+            </a:gdLst>
+            <a:ahLst/>
+            <a:cxnLst>
+              <a:cxn ang="0">
+                <a:pos x="connsiteX0" y="connsiteY0"/>
+              </a:cxn>
+              <a:cxn ang="0">
+                <a:pos x="connsiteX1" y="connsiteY1"/>
+              </a:cxn>
+              <a:cxn ang="0">
+                <a:pos x="connsiteX2" y="connsiteY2"/>
+              </a:cxn>
+              <a:cxn ang="0">
+                <a:pos x="connsiteX3" y="connsiteY3"/>
+              </a:cxn>
+              <a:cxn ang="0">
+                <a:pos x="connsiteX4" y="connsiteY4"/>
+              </a:cxn>
+              <a:cxn ang="0">
+                <a:pos x="connsiteX5" y="connsiteY5"/>
+              </a:cxn>
+              <a:cxn ang="0">
+                <a:pos x="connsiteX6" y="connsiteY6"/>
+              </a:cxn>
+            </a:cxnLst>
+            <a:rect l="l" t="t" r="r" b="b"/>
+            <a:pathLst>
+              <a:path w="3439432" h="3550083">
+                <a:moveTo>
+                  <a:pt x="115336" y="0"/>
+                </a:moveTo>
+                <a:lnTo>
+                  <a:pt x="3439432" y="0"/>
+                </a:lnTo>
+                <a:lnTo>
+                  <a:pt x="3439432" y="3462762"/>
+                </a:lnTo>
+                <a:lnTo>
+                  <a:pt x="3318024" y="3493980"/>
+                </a:lnTo>
+                <a:cubicBezTo>
+                  <a:pt x="3138258" y="3530765"/>
+                  <a:pt x="2952129" y="3550083"/>
+                  <a:pt x="2761488" y="3550083"/>
+                </a:cubicBezTo>
+                <a:cubicBezTo>
+                  <a:pt x="1236360" y="3550083"/>
+                  <a:pt x="0" y="2313723"/>
+                  <a:pt x="0" y="788595"/>
+                </a:cubicBezTo>
+                <a:cubicBezTo>
+                  <a:pt x="0" y="574124"/>
+                  <a:pt x="24450" y="365364"/>
+                  <a:pt x="70713" y="164949"/>
+                </a:cubicBezTo>
+                <a:close/>
+              </a:path>
+            </a:pathLst>
+          </a:custGeom>
+          <a:solidFill>
+            <a:srgbClr val="FFFFFF">
+              <a:alpha val="80000"/>
+            </a:srgbClr>
+          </a:solidFill>
+          <a:ln>
+            <a:noFill/>
+          </a:ln>
+        </p:spPr>
+        <p:style>
+          <a:lnRef idx="2">
+            <a:schemeClr val="accent1">
+              <a:shade val="50000"/>
+            </a:schemeClr>
+          </a:lnRef>
+          <a:fillRef idx="1">
+            <a:schemeClr val="accent1"/>
+          </a:fillRef>
+          <a:effectRef idx="0">
+            <a:schemeClr val="accent1"/>
+          </a:effectRef>
+          <a:fontRef idx="minor">
+            <a:schemeClr val="lt1"/>
+          </a:fontRef>
+        </p:style>
+        <p:txBody>
+          <a:bodyPr wrap="square" rtlCol="0" anchor="ctr">
+            <a:noAutofit/>
+          </a:bodyPr>
+          <a:lstStyle/>
+          <a:p>
+            <a:pPr marL="0" marR="0" lvl="0" indent="0" algn="ctr" defTabSz="914400" rtl="0" eaLnBrk="1" fontAlgn="auto" latinLnBrk="0" hangingPunct="1">
+              <a:lnSpc>
+                <a:spcPct val="100000"/>
+              </a:lnSpc>
+              <a:spcBef>
+                <a:spcPts val="0"/>
+              </a:spcBef>
+              <a:spcAft>
+                <a:spcPts val="0"/>
+              </a:spcAft>
+              <a:buClrTx/>
+              <a:buSzTx/>
+              <a:buFontTx/>
+              <a:buNone/>
+              <a:tabLst/>
+              <a:defRPr/>
+            </a:pPr>
+            <a:endParaRPr kumimoji="0" lang="en-US" sz="1800" b="0" i="0" u="none" strike="noStrike" kern="1200" cap="none" spc="0" normalizeH="0" baseline="0" noProof="0" dirty="0">
+              <a:ln>
+                <a:noFill/>
+              </a:ln>
+              <a:solidFill>
+                <a:prstClr val="white"/>
+              </a:solidFill>
+              <a:effectLst/>
+              <a:uLnTx/>
+              <a:uFillTx/>
+              <a:latin typeface="Calibri" panose="020F0502020204030204"/>
+              <a:ea typeface="+mn-ea"/>
+              <a:cs typeface="+mn-cs"/>
+            </a:endParaRPr>
+          </a:p>
+        </p:txBody>
+      </p:sp>
+      <p:sp>
+        <p:nvSpPr>
+          <p:cNvPr id="51" name="Freeform: Shape 50">
+            <a:extLst>
+              <a:ext uri="{FF2B5EF4-FFF2-40B4-BE49-F238E27FC236}">
+                <a16:creationId xmlns:a16="http://schemas.microsoft.com/office/drawing/2014/main" id="{E2193FF3-0731-4CB1-A0ED-1F3321A42090}"/>
+              </a:ext>
+              <a:ext uri="{C183D7F6-B498-43B3-948B-1728B52AA6E4}">
+                <adec:decorative xmlns:adec="http://schemas.microsoft.com/office/drawing/2017/decorative" val="1"/>
+              </a:ext>
+            </a:extLst>
+          </p:cNvPr>
+          <p:cNvSpPr>
+            <a:spLocks noGrp="1" noRot="1" noChangeAspect="1" noMove="1" noResize="1" noEditPoints="1" noAdjustHandles="1" noChangeArrowheads="1" noChangeShapeType="1" noTextEdit="1"/>
+          </p:cNvSpPr>
+          <p:nvPr>
+            <p:extLst>
+              <p:ext uri="{386F3935-93C4-4BCD-93E2-E3B085C9AB24}">
+                <p16:designElem xmlns:p16="http://schemas.microsoft.com/office/powerpoint/2015/main" val="1"/>
+              </p:ext>
+            </p:extLst>
+          </p:nvPr>
+        </p:nvSpPr>
+        <p:spPr>
+          <a:xfrm>
+            <a:off x="8918761" y="-4331"/>
+            <a:ext cx="3273238" cy="3383891"/>
+          </a:xfrm>
+          <a:custGeom>
+            <a:avLst/>
+            <a:gdLst>
+              <a:gd name="connsiteX0" fmla="*/ 122841 w 3273238"/>
+              <a:gd name="connsiteY0" fmla="*/ 0 h 3383891"/>
+              <a:gd name="connsiteX1" fmla="*/ 3273238 w 3273238"/>
+              <a:gd name="connsiteY1" fmla="*/ 0 h 3383891"/>
+              <a:gd name="connsiteX2" fmla="*/ 3273238 w 3273238"/>
+              <a:gd name="connsiteY2" fmla="*/ 3291335 h 3383891"/>
+              <a:gd name="connsiteX3" fmla="*/ 3118338 w 3273238"/>
+              <a:gd name="connsiteY3" fmla="*/ 3331164 h 3383891"/>
+              <a:gd name="connsiteX4" fmla="*/ 2595295 w 3273238"/>
+              <a:gd name="connsiteY4" fmla="*/ 3383891 h 3383891"/>
+              <a:gd name="connsiteX5" fmla="*/ 0 w 3273238"/>
+              <a:gd name="connsiteY5" fmla="*/ 788596 h 3383891"/>
+              <a:gd name="connsiteX6" fmla="*/ 116679 w 3273238"/>
+              <a:gd name="connsiteY6" fmla="*/ 16835 h 3383891"/>
+            </a:gdLst>
+            <a:ahLst/>
+            <a:cxnLst>
+              <a:cxn ang="0">
+                <a:pos x="connsiteX0" y="connsiteY0"/>
+              </a:cxn>
+              <a:cxn ang="0">
+                <a:pos x="connsiteX1" y="connsiteY1"/>
+              </a:cxn>
+              <a:cxn ang="0">
+                <a:pos x="connsiteX2" y="connsiteY2"/>
+              </a:cxn>
+              <a:cxn ang="0">
+                <a:pos x="connsiteX3" y="connsiteY3"/>
+              </a:cxn>
+              <a:cxn ang="0">
+                <a:pos x="connsiteX4" y="connsiteY4"/>
+              </a:cxn>
+              <a:cxn ang="0">
+                <a:pos x="connsiteX5" y="connsiteY5"/>
+              </a:cxn>
+              <a:cxn ang="0">
+                <a:pos x="connsiteX6" y="connsiteY6"/>
+              </a:cxn>
+            </a:cxnLst>
+            <a:rect l="l" t="t" r="r" b="b"/>
+            <a:pathLst>
+              <a:path w="3273238" h="3383891">
+                <a:moveTo>
+                  <a:pt x="122841" y="0"/>
+                </a:moveTo>
+                <a:lnTo>
+                  <a:pt x="3273238" y="0"/>
+                </a:lnTo>
+                <a:lnTo>
+                  <a:pt x="3273238" y="3291335"/>
+                </a:lnTo>
+                <a:lnTo>
+                  <a:pt x="3118338" y="3331164"/>
+                </a:lnTo>
+                <a:cubicBezTo>
+                  <a:pt x="2949390" y="3365736"/>
+                  <a:pt x="2774463" y="3383891"/>
+                  <a:pt x="2595295" y="3383891"/>
+                </a:cubicBezTo>
+                <a:cubicBezTo>
+                  <a:pt x="1161953" y="3383891"/>
+                  <a:pt x="0" y="2221938"/>
+                  <a:pt x="0" y="788596"/>
+                </a:cubicBezTo>
+                <a:cubicBezTo>
+                  <a:pt x="0" y="519845"/>
+                  <a:pt x="40850" y="260634"/>
+                  <a:pt x="116679" y="16835"/>
+                </a:cubicBezTo>
+                <a:close/>
+              </a:path>
+            </a:pathLst>
+          </a:custGeom>
+          <a:solidFill>
+            <a:schemeClr val="tx1"/>
+          </a:solidFill>
+          <a:ln>
+            <a:noFill/>
+          </a:ln>
+        </p:spPr>
+        <p:style>
+          <a:lnRef idx="2">
+            <a:schemeClr val="accent1">
+              <a:shade val="50000"/>
+            </a:schemeClr>
+          </a:lnRef>
+          <a:fillRef idx="1">
+            <a:schemeClr val="accent1"/>
+          </a:fillRef>
+          <a:effectRef idx="0">
+            <a:schemeClr val="accent1"/>
+          </a:effectRef>
+          <a:fontRef idx="minor">
+            <a:schemeClr val="lt1"/>
+          </a:fontRef>
+        </p:style>
+        <p:txBody>
+          <a:bodyPr wrap="square" rtlCol="0" anchor="ctr">
+            <a:noAutofit/>
+          </a:bodyPr>
+          <a:lstStyle/>
+          <a:p>
+            <a:pPr algn="ctr"/>
+            <a:endParaRPr lang="en-US"/>
+          </a:p>
+        </p:txBody>
+      </p:sp>
+      <p:pic>
+        <p:nvPicPr>
+          <p:cNvPr id="4" name="Imagem 3" descr="Uma imagem contendo desenho, comida&#10;&#10;Descrição gerada automaticamente">
+            <a:extLst>
+              <a:ext uri="{FF2B5EF4-FFF2-40B4-BE49-F238E27FC236}">
+                <a16:creationId xmlns:a16="http://schemas.microsoft.com/office/drawing/2014/main" id="{35E4D1C4-6DB9-43A4-AA98-3F99E6337E32}"/>
+              </a:ext>
+            </a:extLst>
+          </p:cNvPr>
+          <p:cNvPicPr>
+            <a:picLocks noChangeAspect="1"/>
+          </p:cNvPicPr>
+          <p:nvPr/>
+        </p:nvPicPr>
+        <p:blipFill>
+          <a:blip r:embed="rId4"/>
+          <a:stretch>
+            <a:fillRect/>
+          </a:stretch>
+        </p:blipFill>
+        <p:spPr>
+          <a:xfrm>
+            <a:off x="9795435" y="765403"/>
+            <a:ext cx="2063103" cy="1156049"/>
           </a:xfrm>
           <a:prstGeom prst="rect">
             <a:avLst/>
@@ -4535,6 +5244,36 @@
           <p:nvPr/>
         </p:nvPicPr>
         <p:blipFill>
+          <a:blip r:embed="rId5"/>
+          <a:stretch>
+            <a:fillRect/>
+          </a:stretch>
+        </p:blipFill>
+        <p:spPr>
+          <a:xfrm>
+            <a:off x="342910" y="4131427"/>
+            <a:ext cx="2248275" cy="1377068"/>
+          </a:xfrm>
+          <a:prstGeom prst="rect">
+            <a:avLst/>
+          </a:prstGeom>
+        </p:spPr>
+      </p:pic>
+      <p:pic>
+        <p:nvPicPr>
+          <p:cNvPr id="9" name="Imagem 8" descr="Uma imagem contendo texto, desenho, placar, placa&#10;&#10;Descrição gerada automaticamente">
+            <a:extLst>
+              <a:ext uri="{FF2B5EF4-FFF2-40B4-BE49-F238E27FC236}">
+                <a16:creationId xmlns:a16="http://schemas.microsoft.com/office/drawing/2014/main" id="{C251AD62-1E4A-48F8-A2CC-10A01D1216BC}"/>
+              </a:ext>
+            </a:extLst>
+          </p:cNvPr>
+          <p:cNvPicPr>
+            <a:picLocks noChangeAspect="1"/>
+          </p:cNvPicPr>
+          <p:nvPr/>
+        </p:nvPicPr>
+        <p:blipFill>
           <a:blip r:embed="rId6"/>
           <a:stretch>
             <a:fillRect/>
@@ -4542,8 +5281,361 @@
         </p:blipFill>
         <p:spPr>
           <a:xfrm>
-            <a:off x="115265" y="4228198"/>
-            <a:ext cx="3171683" cy="1941433"/>
+            <a:off x="4026747" y="3083855"/>
+            <a:ext cx="1036965" cy="518482"/>
+          </a:xfrm>
+          <a:prstGeom prst="rect">
+            <a:avLst/>
+          </a:prstGeom>
+        </p:spPr>
+      </p:pic>
+      <p:sp>
+        <p:nvSpPr>
+          <p:cNvPr id="53" name="Freeform: Shape 52">
+            <a:extLst>
+              <a:ext uri="{FF2B5EF4-FFF2-40B4-BE49-F238E27FC236}">
+                <a16:creationId xmlns:a16="http://schemas.microsoft.com/office/drawing/2014/main" id="{CB14CE1B-4BC5-4EF2-BE3D-05E4F580B3DB}"/>
+              </a:ext>
+              <a:ext uri="{C183D7F6-B498-43B3-948B-1728B52AA6E4}">
+                <adec:decorative xmlns:adec="http://schemas.microsoft.com/office/drawing/2017/decorative" val="1"/>
+              </a:ext>
+            </a:extLst>
+          </p:cNvPr>
+          <p:cNvSpPr>
+            <a:spLocks noGrp="1" noRot="1" noChangeAspect="1" noMove="1" noResize="1" noEditPoints="1" noAdjustHandles="1" noChangeArrowheads="1" noChangeShapeType="1" noTextEdit="1"/>
+          </p:cNvSpPr>
+          <p:nvPr>
+            <p:extLst>
+              <p:ext uri="{386F3935-93C4-4BCD-93E2-E3B085C9AB24}">
+                <p16:designElem xmlns:p16="http://schemas.microsoft.com/office/powerpoint/2015/main" val="1"/>
+              </p:ext>
+            </p:extLst>
+          </p:nvPr>
+        </p:nvSpPr>
+        <p:spPr>
+          <a:xfrm>
+            <a:off x="9199331" y="3907418"/>
+            <a:ext cx="2992669" cy="2950582"/>
+          </a:xfrm>
+          <a:custGeom>
+            <a:avLst/>
+            <a:gdLst>
+              <a:gd name="connsiteX0" fmla="*/ 2052140 w 2992669"/>
+              <a:gd name="connsiteY0" fmla="*/ 0 h 2950582"/>
+              <a:gd name="connsiteX1" fmla="*/ 2850926 w 2992669"/>
+              <a:gd name="connsiteY1" fmla="*/ 161267 h 2950582"/>
+              <a:gd name="connsiteX2" fmla="*/ 2992669 w 2992669"/>
+              <a:gd name="connsiteY2" fmla="*/ 229549 h 2950582"/>
+              <a:gd name="connsiteX3" fmla="*/ 2992669 w 2992669"/>
+              <a:gd name="connsiteY3" fmla="*/ 2950582 h 2950582"/>
+              <a:gd name="connsiteX4" fmla="*/ 209274 w 2992669"/>
+              <a:gd name="connsiteY4" fmla="*/ 2950582 h 2950582"/>
+              <a:gd name="connsiteX5" fmla="*/ 161267 w 2992669"/>
+              <a:gd name="connsiteY5" fmla="*/ 2850926 h 2950582"/>
+              <a:gd name="connsiteX6" fmla="*/ 0 w 2992669"/>
+              <a:gd name="connsiteY6" fmla="*/ 2052140 h 2950582"/>
+              <a:gd name="connsiteX7" fmla="*/ 2052140 w 2992669"/>
+              <a:gd name="connsiteY7" fmla="*/ 0 h 2950582"/>
+            </a:gdLst>
+            <a:ahLst/>
+            <a:cxnLst>
+              <a:cxn ang="0">
+                <a:pos x="connsiteX0" y="connsiteY0"/>
+              </a:cxn>
+              <a:cxn ang="0">
+                <a:pos x="connsiteX1" y="connsiteY1"/>
+              </a:cxn>
+              <a:cxn ang="0">
+                <a:pos x="connsiteX2" y="connsiteY2"/>
+              </a:cxn>
+              <a:cxn ang="0">
+                <a:pos x="connsiteX3" y="connsiteY3"/>
+              </a:cxn>
+              <a:cxn ang="0">
+                <a:pos x="connsiteX4" y="connsiteY4"/>
+              </a:cxn>
+              <a:cxn ang="0">
+                <a:pos x="connsiteX5" y="connsiteY5"/>
+              </a:cxn>
+              <a:cxn ang="0">
+                <a:pos x="connsiteX6" y="connsiteY6"/>
+              </a:cxn>
+              <a:cxn ang="0">
+                <a:pos x="connsiteX7" y="connsiteY7"/>
+              </a:cxn>
+            </a:cxnLst>
+            <a:rect l="l" t="t" r="r" b="b"/>
+            <a:pathLst>
+              <a:path w="2992669" h="2950582">
+                <a:moveTo>
+                  <a:pt x="2052140" y="0"/>
+                </a:moveTo>
+                <a:cubicBezTo>
+                  <a:pt x="2335482" y="0"/>
+                  <a:pt x="2605411" y="57424"/>
+                  <a:pt x="2850926" y="161267"/>
+                </a:cubicBezTo>
+                <a:lnTo>
+                  <a:pt x="2992669" y="229549"/>
+                </a:lnTo>
+                <a:lnTo>
+                  <a:pt x="2992669" y="2950582"/>
+                </a:lnTo>
+                <a:lnTo>
+                  <a:pt x="209274" y="2950582"/>
+                </a:lnTo>
+                <a:lnTo>
+                  <a:pt x="161267" y="2850926"/>
+                </a:lnTo>
+                <a:cubicBezTo>
+                  <a:pt x="57423" y="2605411"/>
+                  <a:pt x="0" y="2335482"/>
+                  <a:pt x="0" y="2052140"/>
+                </a:cubicBezTo>
+                <a:cubicBezTo>
+                  <a:pt x="0" y="918774"/>
+                  <a:pt x="918774" y="0"/>
+                  <a:pt x="2052140" y="0"/>
+                </a:cubicBezTo>
+                <a:close/>
+              </a:path>
+            </a:pathLst>
+          </a:custGeom>
+          <a:solidFill>
+            <a:srgbClr val="FFFFFF">
+              <a:alpha val="80000"/>
+            </a:srgbClr>
+          </a:solidFill>
+          <a:ln>
+            <a:noFill/>
+          </a:ln>
+        </p:spPr>
+        <p:style>
+          <a:lnRef idx="2">
+            <a:schemeClr val="accent1">
+              <a:shade val="50000"/>
+            </a:schemeClr>
+          </a:lnRef>
+          <a:fillRef idx="1">
+            <a:schemeClr val="accent1"/>
+          </a:fillRef>
+          <a:effectRef idx="0">
+            <a:schemeClr val="accent1"/>
+          </a:effectRef>
+          <a:fontRef idx="minor">
+            <a:schemeClr val="lt1"/>
+          </a:fontRef>
+        </p:style>
+        <p:txBody>
+          <a:bodyPr wrap="square" rtlCol="0" anchor="ctr">
+            <a:noAutofit/>
+          </a:bodyPr>
+          <a:lstStyle/>
+          <a:p>
+            <a:pPr marL="0" marR="0" lvl="0" indent="0" algn="ctr" defTabSz="914400" rtl="0" eaLnBrk="1" fontAlgn="auto" latinLnBrk="0" hangingPunct="1">
+              <a:lnSpc>
+                <a:spcPct val="100000"/>
+              </a:lnSpc>
+              <a:spcBef>
+                <a:spcPts val="0"/>
+              </a:spcBef>
+              <a:spcAft>
+                <a:spcPts val="0"/>
+              </a:spcAft>
+              <a:buClrTx/>
+              <a:buSzTx/>
+              <a:buFontTx/>
+              <a:buNone/>
+              <a:tabLst/>
+              <a:defRPr/>
+            </a:pPr>
+            <a:endParaRPr kumimoji="0" lang="en-US" sz="1800" b="0" i="0" u="none" strike="noStrike" kern="1200" cap="none" spc="0" normalizeH="0" baseline="0" noProof="0">
+              <a:ln>
+                <a:noFill/>
+              </a:ln>
+              <a:solidFill>
+                <a:prstClr val="white"/>
+              </a:solidFill>
+              <a:effectLst/>
+              <a:uLnTx/>
+              <a:uFillTx/>
+              <a:latin typeface="Calibri" panose="020F0502020204030204"/>
+              <a:ea typeface="+mn-ea"/>
+              <a:cs typeface="+mn-cs"/>
+            </a:endParaRPr>
+          </a:p>
+        </p:txBody>
+      </p:sp>
+      <p:sp>
+        <p:nvSpPr>
+          <p:cNvPr id="55" name="Freeform: Shape 54">
+            <a:extLst>
+              <a:ext uri="{FF2B5EF4-FFF2-40B4-BE49-F238E27FC236}">
+                <a16:creationId xmlns:a16="http://schemas.microsoft.com/office/drawing/2014/main" id="{A1CCC4E2-0E38-41AA-A1C5-DBB03438714F}"/>
+              </a:ext>
+              <a:ext uri="{C183D7F6-B498-43B3-948B-1728B52AA6E4}">
+                <adec:decorative xmlns:adec="http://schemas.microsoft.com/office/drawing/2017/decorative" val="1"/>
+              </a:ext>
+            </a:extLst>
+          </p:cNvPr>
+          <p:cNvSpPr>
+            <a:spLocks noGrp="1" noRot="1" noChangeAspect="1" noMove="1" noResize="1" noEditPoints="1" noAdjustHandles="1" noChangeArrowheads="1" noChangeShapeType="1" noTextEdit="1"/>
+          </p:cNvSpPr>
+          <p:nvPr>
+            <p:extLst>
+              <p:ext uri="{386F3935-93C4-4BCD-93E2-E3B085C9AB24}">
+                <p16:designElem xmlns:p16="http://schemas.microsoft.com/office/powerpoint/2015/main" val="1"/>
+              </p:ext>
+            </p:extLst>
+          </p:nvPr>
+        </p:nvSpPr>
+        <p:spPr>
+          <a:xfrm>
+            <a:off x="9363238" y="4071322"/>
+            <a:ext cx="2828765" cy="2786678"/>
+          </a:xfrm>
+          <a:custGeom>
+            <a:avLst/>
+            <a:gdLst>
+              <a:gd name="connsiteX0" fmla="*/ 1888236 w 2828765"/>
+              <a:gd name="connsiteY0" fmla="*/ 0 h 2786678"/>
+              <a:gd name="connsiteX1" fmla="*/ 2788281 w 2828765"/>
+              <a:gd name="connsiteY1" fmla="*/ 227900 h 2786678"/>
+              <a:gd name="connsiteX2" fmla="*/ 2828765 w 2828765"/>
+              <a:gd name="connsiteY2" fmla="*/ 252495 h 2786678"/>
+              <a:gd name="connsiteX3" fmla="*/ 2828765 w 2828765"/>
+              <a:gd name="connsiteY3" fmla="*/ 2786678 h 2786678"/>
+              <a:gd name="connsiteX4" fmla="*/ 227128 w 2828765"/>
+              <a:gd name="connsiteY4" fmla="*/ 2786678 h 2786678"/>
+              <a:gd name="connsiteX5" fmla="*/ 148387 w 2828765"/>
+              <a:gd name="connsiteY5" fmla="*/ 2623223 h 2786678"/>
+              <a:gd name="connsiteX6" fmla="*/ 0 w 2828765"/>
+              <a:gd name="connsiteY6" fmla="*/ 1888236 h 2786678"/>
+              <a:gd name="connsiteX7" fmla="*/ 1888236 w 2828765"/>
+              <a:gd name="connsiteY7" fmla="*/ 0 h 2786678"/>
+            </a:gdLst>
+            <a:ahLst/>
+            <a:cxnLst>
+              <a:cxn ang="0">
+                <a:pos x="connsiteX0" y="connsiteY0"/>
+              </a:cxn>
+              <a:cxn ang="0">
+                <a:pos x="connsiteX1" y="connsiteY1"/>
+              </a:cxn>
+              <a:cxn ang="0">
+                <a:pos x="connsiteX2" y="connsiteY2"/>
+              </a:cxn>
+              <a:cxn ang="0">
+                <a:pos x="connsiteX3" y="connsiteY3"/>
+              </a:cxn>
+              <a:cxn ang="0">
+                <a:pos x="connsiteX4" y="connsiteY4"/>
+              </a:cxn>
+              <a:cxn ang="0">
+                <a:pos x="connsiteX5" y="connsiteY5"/>
+              </a:cxn>
+              <a:cxn ang="0">
+                <a:pos x="connsiteX6" y="connsiteY6"/>
+              </a:cxn>
+              <a:cxn ang="0">
+                <a:pos x="connsiteX7" y="connsiteY7"/>
+              </a:cxn>
+            </a:cxnLst>
+            <a:rect l="l" t="t" r="r" b="b"/>
+            <a:pathLst>
+              <a:path w="2828765" h="2786678">
+                <a:moveTo>
+                  <a:pt x="1888236" y="0"/>
+                </a:moveTo>
+                <a:cubicBezTo>
+                  <a:pt x="2214125" y="0"/>
+                  <a:pt x="2520731" y="82558"/>
+                  <a:pt x="2788281" y="227900"/>
+                </a:cubicBezTo>
+                <a:lnTo>
+                  <a:pt x="2828765" y="252495"/>
+                </a:lnTo>
+                <a:lnTo>
+                  <a:pt x="2828765" y="2786678"/>
+                </a:lnTo>
+                <a:lnTo>
+                  <a:pt x="227128" y="2786678"/>
+                </a:lnTo>
+                <a:lnTo>
+                  <a:pt x="148387" y="2623223"/>
+                </a:lnTo>
+                <a:cubicBezTo>
+                  <a:pt x="52837" y="2397318"/>
+                  <a:pt x="0" y="2148947"/>
+                  <a:pt x="0" y="1888236"/>
+                </a:cubicBezTo>
+                <a:cubicBezTo>
+                  <a:pt x="0" y="845392"/>
+                  <a:pt x="845392" y="0"/>
+                  <a:pt x="1888236" y="0"/>
+                </a:cubicBezTo>
+                <a:close/>
+              </a:path>
+            </a:pathLst>
+          </a:custGeom>
+          <a:solidFill>
+            <a:schemeClr val="tx1"/>
+          </a:solidFill>
+          <a:ln>
+            <a:noFill/>
+          </a:ln>
+        </p:spPr>
+        <p:style>
+          <a:lnRef idx="2">
+            <a:schemeClr val="accent1">
+              <a:shade val="50000"/>
+            </a:schemeClr>
+          </a:lnRef>
+          <a:fillRef idx="1">
+            <a:schemeClr val="accent1"/>
+          </a:fillRef>
+          <a:effectRef idx="0">
+            <a:schemeClr val="accent1"/>
+          </a:effectRef>
+          <a:fontRef idx="minor">
+            <a:schemeClr val="lt1"/>
+          </a:fontRef>
+        </p:style>
+        <p:txBody>
+          <a:bodyPr wrap="square" rtlCol="0" anchor="ctr">
+            <a:noAutofit/>
+          </a:bodyPr>
+          <a:lstStyle/>
+          <a:p>
+            <a:pPr algn="ctr"/>
+            <a:endParaRPr lang="en-US"/>
+          </a:p>
+        </p:txBody>
+      </p:sp>
+      <p:pic>
+        <p:nvPicPr>
+          <p:cNvPr id="6" name="Imagem 5" descr="Tela de celular com texto preto sobre fundo branco&#10;&#10;Descrição gerada automaticamente">
+            <a:extLst>
+              <a:ext uri="{FF2B5EF4-FFF2-40B4-BE49-F238E27FC236}">
+                <a16:creationId xmlns:a16="http://schemas.microsoft.com/office/drawing/2014/main" id="{57E15E8F-6A3F-49A7-929E-BEF7851319B1}"/>
+              </a:ext>
+            </a:extLst>
+          </p:cNvPr>
+          <p:cNvPicPr>
+            <a:picLocks noChangeAspect="1"/>
+          </p:cNvPicPr>
+          <p:nvPr/>
+        </p:nvPicPr>
+        <p:blipFill>
+          <a:blip r:embed="rId7"/>
+          <a:stretch>
+            <a:fillRect/>
+          </a:stretch>
+        </p:blipFill>
+        <p:spPr>
+          <a:xfrm>
+            <a:off x="9903013" y="5249568"/>
+            <a:ext cx="2052346" cy="938948"/>
           </a:xfrm>
           <a:prstGeom prst="rect">
             <a:avLst/>
@@ -5127,6 +6219,1087 @@
           <a:chExt cx="0" cy="0"/>
         </a:xfrm>
       </p:grpSpPr>
+      <p:sp useBgFill="1">
+        <p:nvSpPr>
+          <p:cNvPr id="9" name="Rectangle 8">
+            <a:extLst>
+              <a:ext uri="{FF2B5EF4-FFF2-40B4-BE49-F238E27FC236}">
+                <a16:creationId xmlns:a16="http://schemas.microsoft.com/office/drawing/2014/main" id="{33CD251C-A887-4D2F-925B-FC097198538B}"/>
+              </a:ext>
+              <a:ext uri="{C183D7F6-B498-43B3-948B-1728B52AA6E4}">
+                <adec:decorative xmlns:adec="http://schemas.microsoft.com/office/drawing/2017/decorative" val="1"/>
+              </a:ext>
+            </a:extLst>
+          </p:cNvPr>
+          <p:cNvSpPr>
+            <a:spLocks noGrp="1" noRot="1" noChangeAspect="1" noMove="1" noResize="1" noEditPoints="1" noAdjustHandles="1" noChangeArrowheads="1" noChangeShapeType="1" noTextEdit="1"/>
+          </p:cNvSpPr>
+          <p:nvPr>
+            <p:extLst>
+              <p:ext uri="{386F3935-93C4-4BCD-93E2-E3B085C9AB24}">
+                <p16:designElem xmlns:p16="http://schemas.microsoft.com/office/powerpoint/2015/main" val="1"/>
+              </p:ext>
+            </p:extLst>
+          </p:nvPr>
+        </p:nvSpPr>
+        <p:spPr>
+          <a:xfrm>
+            <a:off x="0" y="0"/>
+            <a:ext cx="12192000" cy="6858000"/>
+          </a:xfrm>
+          <a:prstGeom prst="rect">
+            <a:avLst/>
+          </a:prstGeom>
+          <a:ln>
+            <a:noFill/>
+          </a:ln>
+        </p:spPr>
+        <p:style>
+          <a:lnRef idx="2">
+            <a:schemeClr val="accent1">
+              <a:shade val="50000"/>
+            </a:schemeClr>
+          </a:lnRef>
+          <a:fillRef idx="1">
+            <a:schemeClr val="accent1"/>
+          </a:fillRef>
+          <a:effectRef idx="0">
+            <a:schemeClr val="accent1"/>
+          </a:effectRef>
+          <a:fontRef idx="minor">
+            <a:schemeClr val="lt1"/>
+          </a:fontRef>
+        </p:style>
+        <p:txBody>
+          <a:bodyPr rtlCol="0" anchor="ctr"/>
+          <a:lstStyle/>
+          <a:p>
+            <a:pPr algn="ctr"/>
+            <a:endParaRPr lang="en-US"/>
+          </a:p>
+        </p:txBody>
+      </p:sp>
+      <p:sp>
+        <p:nvSpPr>
+          <p:cNvPr id="11" name="Rectangle 10">
+            <a:extLst>
+              <a:ext uri="{FF2B5EF4-FFF2-40B4-BE49-F238E27FC236}">
+                <a16:creationId xmlns:a16="http://schemas.microsoft.com/office/drawing/2014/main" id="{B19D093C-27FB-4032-B282-42C4563F257C}"/>
+              </a:ext>
+              <a:ext uri="{C183D7F6-B498-43B3-948B-1728B52AA6E4}">
+                <adec:decorative xmlns:adec="http://schemas.microsoft.com/office/drawing/2017/decorative" val="1"/>
+              </a:ext>
+            </a:extLst>
+          </p:cNvPr>
+          <p:cNvSpPr>
+            <a:spLocks noGrp="1" noRot="1" noChangeAspect="1" noMove="1" noResize="1" noEditPoints="1" noAdjustHandles="1" noChangeArrowheads="1" noChangeShapeType="1" noTextEdit="1"/>
+          </p:cNvSpPr>
+          <p:nvPr>
+            <p:extLst>
+              <p:ext uri="{386F3935-93C4-4BCD-93E2-E3B085C9AB24}">
+                <p16:designElem xmlns:p16="http://schemas.microsoft.com/office/powerpoint/2015/main" val="1"/>
+              </p:ext>
+            </p:extLst>
+          </p:nvPr>
+        </p:nvSpPr>
+        <p:spPr>
+          <a:xfrm>
+            <a:off x="0" y="0"/>
+            <a:ext cx="4694548" cy="6858000"/>
+          </a:xfrm>
+          <a:prstGeom prst="rect">
+            <a:avLst/>
+          </a:prstGeom>
+          <a:solidFill>
+            <a:schemeClr val="tx1"/>
+          </a:solidFill>
+          <a:ln>
+            <a:noFill/>
+          </a:ln>
+        </p:spPr>
+        <p:style>
+          <a:lnRef idx="2">
+            <a:schemeClr val="accent1">
+              <a:shade val="50000"/>
+            </a:schemeClr>
+          </a:lnRef>
+          <a:fillRef idx="1">
+            <a:schemeClr val="accent1"/>
+          </a:fillRef>
+          <a:effectRef idx="0">
+            <a:schemeClr val="accent1"/>
+          </a:effectRef>
+          <a:fontRef idx="minor">
+            <a:schemeClr val="lt1"/>
+          </a:fontRef>
+        </p:style>
+        <p:txBody>
+          <a:bodyPr rtlCol="0" anchor="ctr"/>
+          <a:lstStyle/>
+          <a:p>
+            <a:pPr algn="ctr"/>
+            <a:endParaRPr lang="en-US"/>
+          </a:p>
+        </p:txBody>
+      </p:sp>
+      <p:grpSp>
+        <p:nvGrpSpPr>
+          <p:cNvPr id="13" name="Group 12">
+            <a:extLst>
+              <a:ext uri="{FF2B5EF4-FFF2-40B4-BE49-F238E27FC236}">
+                <a16:creationId xmlns:a16="http://schemas.microsoft.com/office/drawing/2014/main" id="{35EE815E-1BD3-4777-B652-6D98825BF66B}"/>
+              </a:ext>
+              <a:ext uri="{C183D7F6-B498-43B3-948B-1728B52AA6E4}">
+                <adec:decorative xmlns:adec="http://schemas.microsoft.com/office/drawing/2017/decorative" val="1"/>
+              </a:ext>
+            </a:extLst>
+          </p:cNvPr>
+          <p:cNvGrpSpPr>
+            <a:grpSpLocks noGrp="1" noUngrp="1" noRot="1" noChangeAspect="1" noMove="1" noResize="1"/>
+          </p:cNvGrpSpPr>
+          <p:nvPr>
+            <p:extLst>
+              <p:ext uri="{386F3935-93C4-4BCD-93E2-E3B085C9AB24}">
+                <p16:designElem xmlns:p16="http://schemas.microsoft.com/office/powerpoint/2015/main" val="1"/>
+              </p:ext>
+            </p:extLst>
+          </p:nvPr>
+        </p:nvGrpSpPr>
+        <p:grpSpPr>
+          <a:xfrm>
+            <a:off x="767290" y="681628"/>
+            <a:ext cx="1128382" cy="847206"/>
+            <a:chOff x="668003" y="1684057"/>
+            <a:chExt cx="1128382" cy="847206"/>
+          </a:xfrm>
+        </p:grpSpPr>
+        <p:sp>
+          <p:nvSpPr>
+            <p:cNvPr id="14" name="Freeform 5">
+              <a:extLst>
+                <a:ext uri="{FF2B5EF4-FFF2-40B4-BE49-F238E27FC236}">
+                  <a16:creationId xmlns:a16="http://schemas.microsoft.com/office/drawing/2014/main" id="{E6692982-4A7D-4392-87CD-F0CD4B027DDE}"/>
+                </a:ext>
+                <a:ext uri="{C183D7F6-B498-43B3-948B-1728B52AA6E4}">
+                  <adec:decorative xmlns:adec="http://schemas.microsoft.com/office/drawing/2017/decorative" val="1"/>
+                </a:ext>
+              </a:extLst>
+            </p:cNvPr>
+            <p:cNvSpPr>
+              <a:spLocks/>
+            </p:cNvSpPr>
+            <p:nvPr>
+              <p:extLst>
+                <p:ext uri="{386F3935-93C4-4BCD-93E2-E3B085C9AB24}">
+                  <p16:designElem xmlns:p16="http://schemas.microsoft.com/office/powerpoint/2015/main" val="1"/>
+                </p:ext>
+              </p:extLst>
+            </p:nvPr>
+          </p:nvSpPr>
+          <p:spPr bwMode="auto">
+            <a:xfrm>
+              <a:off x="668003" y="1935883"/>
+              <a:ext cx="675351" cy="595380"/>
+            </a:xfrm>
+            <a:custGeom>
+              <a:avLst/>
+              <a:gdLst>
+                <a:gd name="T0" fmla="*/ 225 w 785"/>
+                <a:gd name="T1" fmla="*/ 692 h 692"/>
+                <a:gd name="T2" fmla="*/ 177 w 785"/>
+                <a:gd name="T3" fmla="*/ 665 h 692"/>
+                <a:gd name="T4" fmla="*/ 9 w 785"/>
+                <a:gd name="T5" fmla="*/ 374 h 692"/>
+                <a:gd name="T6" fmla="*/ 9 w 785"/>
+                <a:gd name="T7" fmla="*/ 318 h 692"/>
+                <a:gd name="T8" fmla="*/ 177 w 785"/>
+                <a:gd name="T9" fmla="*/ 27 h 692"/>
+                <a:gd name="T10" fmla="*/ 225 w 785"/>
+                <a:gd name="T11" fmla="*/ 0 h 692"/>
+                <a:gd name="T12" fmla="*/ 561 w 785"/>
+                <a:gd name="T13" fmla="*/ 0 h 692"/>
+                <a:gd name="T14" fmla="*/ 609 w 785"/>
+                <a:gd name="T15" fmla="*/ 27 h 692"/>
+                <a:gd name="T16" fmla="*/ 777 w 785"/>
+                <a:gd name="T17" fmla="*/ 318 h 692"/>
+                <a:gd name="T18" fmla="*/ 777 w 785"/>
+                <a:gd name="T19" fmla="*/ 374 h 692"/>
+                <a:gd name="T20" fmla="*/ 609 w 785"/>
+                <a:gd name="T21" fmla="*/ 665 h 692"/>
+                <a:gd name="T22" fmla="*/ 561 w 785"/>
+                <a:gd name="T23" fmla="*/ 692 h 692"/>
+                <a:gd name="T24" fmla="*/ 225 w 785"/>
+                <a:gd name="T25" fmla="*/ 692 h 692"/>
+              </a:gdLst>
+              <a:ahLst/>
+              <a:cxnLst>
+                <a:cxn ang="0">
+                  <a:pos x="T0" y="T1"/>
+                </a:cxn>
+                <a:cxn ang="0">
+                  <a:pos x="T2" y="T3"/>
+                </a:cxn>
+                <a:cxn ang="0">
+                  <a:pos x="T4" y="T5"/>
+                </a:cxn>
+                <a:cxn ang="0">
+                  <a:pos x="T6" y="T7"/>
+                </a:cxn>
+                <a:cxn ang="0">
+                  <a:pos x="T8" y="T9"/>
+                </a:cxn>
+                <a:cxn ang="0">
+                  <a:pos x="T10" y="T11"/>
+                </a:cxn>
+                <a:cxn ang="0">
+                  <a:pos x="T12" y="T13"/>
+                </a:cxn>
+                <a:cxn ang="0">
+                  <a:pos x="T14" y="T15"/>
+                </a:cxn>
+                <a:cxn ang="0">
+                  <a:pos x="T16" y="T17"/>
+                </a:cxn>
+                <a:cxn ang="0">
+                  <a:pos x="T18" y="T19"/>
+                </a:cxn>
+                <a:cxn ang="0">
+                  <a:pos x="T20" y="T21"/>
+                </a:cxn>
+                <a:cxn ang="0">
+                  <a:pos x="T22" y="T23"/>
+                </a:cxn>
+                <a:cxn ang="0">
+                  <a:pos x="T24" y="T25"/>
+                </a:cxn>
+              </a:cxnLst>
+              <a:rect l="0" t="0" r="r" b="b"/>
+              <a:pathLst>
+                <a:path w="785" h="692">
+                  <a:moveTo>
+                    <a:pt x="225" y="692"/>
+                  </a:moveTo>
+                  <a:cubicBezTo>
+                    <a:pt x="207" y="692"/>
+                    <a:pt x="185" y="680"/>
+                    <a:pt x="177" y="665"/>
+                  </a:cubicBezTo>
+                  <a:cubicBezTo>
+                    <a:pt x="9" y="374"/>
+                    <a:pt x="9" y="374"/>
+                    <a:pt x="9" y="374"/>
+                  </a:cubicBezTo>
+                  <a:cubicBezTo>
+                    <a:pt x="0" y="358"/>
+                    <a:pt x="0" y="334"/>
+                    <a:pt x="9" y="318"/>
+                  </a:cubicBezTo>
+                  <a:cubicBezTo>
+                    <a:pt x="177" y="27"/>
+                    <a:pt x="177" y="27"/>
+                    <a:pt x="177" y="27"/>
+                  </a:cubicBezTo>
+                  <a:cubicBezTo>
+                    <a:pt x="185" y="12"/>
+                    <a:pt x="207" y="0"/>
+                    <a:pt x="225" y="0"/>
+                  </a:cubicBezTo>
+                  <a:cubicBezTo>
+                    <a:pt x="561" y="0"/>
+                    <a:pt x="561" y="0"/>
+                    <a:pt x="561" y="0"/>
+                  </a:cubicBezTo>
+                  <a:cubicBezTo>
+                    <a:pt x="578" y="0"/>
+                    <a:pt x="600" y="12"/>
+                    <a:pt x="609" y="27"/>
+                  </a:cubicBezTo>
+                  <a:cubicBezTo>
+                    <a:pt x="777" y="318"/>
+                    <a:pt x="777" y="318"/>
+                    <a:pt x="777" y="318"/>
+                  </a:cubicBezTo>
+                  <a:cubicBezTo>
+                    <a:pt x="785" y="334"/>
+                    <a:pt x="785" y="358"/>
+                    <a:pt x="777" y="374"/>
+                  </a:cubicBezTo>
+                  <a:cubicBezTo>
+                    <a:pt x="609" y="665"/>
+                    <a:pt x="609" y="665"/>
+                    <a:pt x="609" y="665"/>
+                  </a:cubicBezTo>
+                  <a:cubicBezTo>
+                    <a:pt x="600" y="680"/>
+                    <a:pt x="578" y="692"/>
+                    <a:pt x="561" y="692"/>
+                  </a:cubicBezTo>
+                  <a:lnTo>
+                    <a:pt x="225" y="692"/>
+                  </a:lnTo>
+                  <a:close/>
+                </a:path>
+              </a:pathLst>
+            </a:custGeom>
+            <a:noFill/>
+            <a:ln w="28575" cmpd="sng">
+              <a:solidFill>
+                <a:schemeClr val="bg1"/>
+              </a:solidFill>
+            </a:ln>
+          </p:spPr>
+          <p:txBody>
+            <a:bodyPr vert="horz" wrap="square" lIns="91440" tIns="45720" rIns="91440" bIns="45720" numCol="1" anchor="t" anchorCtr="0" compatLnSpc="1">
+              <a:prstTxWarp prst="textNoShape">
+                <a:avLst/>
+              </a:prstTxWarp>
+            </a:bodyPr>
+            <a:lstStyle/>
+            <a:p>
+              <a:endParaRPr lang="en-US"/>
+            </a:p>
+          </p:txBody>
+        </p:sp>
+        <p:sp>
+          <p:nvSpPr>
+            <p:cNvPr id="15" name="Freeform 5">
+              <a:extLst>
+                <a:ext uri="{FF2B5EF4-FFF2-40B4-BE49-F238E27FC236}">
+                  <a16:creationId xmlns:a16="http://schemas.microsoft.com/office/drawing/2014/main" id="{196485F7-F277-4123-AC53-98EA4C858774}"/>
+                </a:ext>
+                <a:ext uri="{C183D7F6-B498-43B3-948B-1728B52AA6E4}">
+                  <adec:decorative xmlns:adec="http://schemas.microsoft.com/office/drawing/2017/decorative" val="1"/>
+                </a:ext>
+              </a:extLst>
+            </p:cNvPr>
+            <p:cNvSpPr>
+              <a:spLocks/>
+            </p:cNvSpPr>
+            <p:nvPr>
+              <p:extLst>
+                <p:ext uri="{386F3935-93C4-4BCD-93E2-E3B085C9AB24}">
+                  <p16:designElem xmlns:p16="http://schemas.microsoft.com/office/powerpoint/2015/main" val="1"/>
+                </p:ext>
+              </p:extLst>
+            </p:nvPr>
+          </p:nvSpPr>
+          <p:spPr bwMode="auto">
+            <a:xfrm>
+              <a:off x="1245893" y="1684057"/>
+              <a:ext cx="550492" cy="485306"/>
+            </a:xfrm>
+            <a:custGeom>
+              <a:avLst/>
+              <a:gdLst>
+                <a:gd name="T0" fmla="*/ 225 w 785"/>
+                <a:gd name="T1" fmla="*/ 692 h 692"/>
+                <a:gd name="T2" fmla="*/ 177 w 785"/>
+                <a:gd name="T3" fmla="*/ 665 h 692"/>
+                <a:gd name="T4" fmla="*/ 9 w 785"/>
+                <a:gd name="T5" fmla="*/ 374 h 692"/>
+                <a:gd name="T6" fmla="*/ 9 w 785"/>
+                <a:gd name="T7" fmla="*/ 318 h 692"/>
+                <a:gd name="T8" fmla="*/ 177 w 785"/>
+                <a:gd name="T9" fmla="*/ 27 h 692"/>
+                <a:gd name="T10" fmla="*/ 225 w 785"/>
+                <a:gd name="T11" fmla="*/ 0 h 692"/>
+                <a:gd name="T12" fmla="*/ 561 w 785"/>
+                <a:gd name="T13" fmla="*/ 0 h 692"/>
+                <a:gd name="T14" fmla="*/ 609 w 785"/>
+                <a:gd name="T15" fmla="*/ 27 h 692"/>
+                <a:gd name="T16" fmla="*/ 777 w 785"/>
+                <a:gd name="T17" fmla="*/ 318 h 692"/>
+                <a:gd name="T18" fmla="*/ 777 w 785"/>
+                <a:gd name="T19" fmla="*/ 374 h 692"/>
+                <a:gd name="T20" fmla="*/ 609 w 785"/>
+                <a:gd name="T21" fmla="*/ 665 h 692"/>
+                <a:gd name="T22" fmla="*/ 561 w 785"/>
+                <a:gd name="T23" fmla="*/ 692 h 692"/>
+                <a:gd name="T24" fmla="*/ 225 w 785"/>
+                <a:gd name="T25" fmla="*/ 692 h 692"/>
+              </a:gdLst>
+              <a:ahLst/>
+              <a:cxnLst>
+                <a:cxn ang="0">
+                  <a:pos x="T0" y="T1"/>
+                </a:cxn>
+                <a:cxn ang="0">
+                  <a:pos x="T2" y="T3"/>
+                </a:cxn>
+                <a:cxn ang="0">
+                  <a:pos x="T4" y="T5"/>
+                </a:cxn>
+                <a:cxn ang="0">
+                  <a:pos x="T6" y="T7"/>
+                </a:cxn>
+                <a:cxn ang="0">
+                  <a:pos x="T8" y="T9"/>
+                </a:cxn>
+                <a:cxn ang="0">
+                  <a:pos x="T10" y="T11"/>
+                </a:cxn>
+                <a:cxn ang="0">
+                  <a:pos x="T12" y="T13"/>
+                </a:cxn>
+                <a:cxn ang="0">
+                  <a:pos x="T14" y="T15"/>
+                </a:cxn>
+                <a:cxn ang="0">
+                  <a:pos x="T16" y="T17"/>
+                </a:cxn>
+                <a:cxn ang="0">
+                  <a:pos x="T18" y="T19"/>
+                </a:cxn>
+                <a:cxn ang="0">
+                  <a:pos x="T20" y="T21"/>
+                </a:cxn>
+                <a:cxn ang="0">
+                  <a:pos x="T22" y="T23"/>
+                </a:cxn>
+                <a:cxn ang="0">
+                  <a:pos x="T24" y="T25"/>
+                </a:cxn>
+              </a:cxnLst>
+              <a:rect l="0" t="0" r="r" b="b"/>
+              <a:pathLst>
+                <a:path w="785" h="692">
+                  <a:moveTo>
+                    <a:pt x="225" y="692"/>
+                  </a:moveTo>
+                  <a:cubicBezTo>
+                    <a:pt x="207" y="692"/>
+                    <a:pt x="185" y="680"/>
+                    <a:pt x="177" y="665"/>
+                  </a:cubicBezTo>
+                  <a:cubicBezTo>
+                    <a:pt x="9" y="374"/>
+                    <a:pt x="9" y="374"/>
+                    <a:pt x="9" y="374"/>
+                  </a:cubicBezTo>
+                  <a:cubicBezTo>
+                    <a:pt x="0" y="358"/>
+                    <a:pt x="0" y="334"/>
+                    <a:pt x="9" y="318"/>
+                  </a:cubicBezTo>
+                  <a:cubicBezTo>
+                    <a:pt x="177" y="27"/>
+                    <a:pt x="177" y="27"/>
+                    <a:pt x="177" y="27"/>
+                  </a:cubicBezTo>
+                  <a:cubicBezTo>
+                    <a:pt x="185" y="12"/>
+                    <a:pt x="207" y="0"/>
+                    <a:pt x="225" y="0"/>
+                  </a:cubicBezTo>
+                  <a:cubicBezTo>
+                    <a:pt x="561" y="0"/>
+                    <a:pt x="561" y="0"/>
+                    <a:pt x="561" y="0"/>
+                  </a:cubicBezTo>
+                  <a:cubicBezTo>
+                    <a:pt x="578" y="0"/>
+                    <a:pt x="600" y="12"/>
+                    <a:pt x="609" y="27"/>
+                  </a:cubicBezTo>
+                  <a:cubicBezTo>
+                    <a:pt x="777" y="318"/>
+                    <a:pt x="777" y="318"/>
+                    <a:pt x="777" y="318"/>
+                  </a:cubicBezTo>
+                  <a:cubicBezTo>
+                    <a:pt x="785" y="334"/>
+                    <a:pt x="785" y="358"/>
+                    <a:pt x="777" y="374"/>
+                  </a:cubicBezTo>
+                  <a:cubicBezTo>
+                    <a:pt x="609" y="665"/>
+                    <a:pt x="609" y="665"/>
+                    <a:pt x="609" y="665"/>
+                  </a:cubicBezTo>
+                  <a:cubicBezTo>
+                    <a:pt x="600" y="680"/>
+                    <a:pt x="578" y="692"/>
+                    <a:pt x="561" y="692"/>
+                  </a:cubicBezTo>
+                  <a:lnTo>
+                    <a:pt x="225" y="692"/>
+                  </a:lnTo>
+                  <a:close/>
+                </a:path>
+              </a:pathLst>
+            </a:custGeom>
+            <a:noFill/>
+            <a:ln w="28575" cmpd="sng">
+              <a:solidFill>
+                <a:schemeClr val="bg1"/>
+              </a:solidFill>
+            </a:ln>
+          </p:spPr>
+          <p:txBody>
+            <a:bodyPr vert="horz" wrap="square" lIns="91440" tIns="45720" rIns="91440" bIns="45720" numCol="1" anchor="t" anchorCtr="0" compatLnSpc="1">
+              <a:prstTxWarp prst="textNoShape">
+                <a:avLst/>
+              </a:prstTxWarp>
+            </a:bodyPr>
+            <a:lstStyle/>
+            <a:p>
+              <a:endParaRPr lang="en-US"/>
+            </a:p>
+          </p:txBody>
+        </p:sp>
+      </p:grpSp>
+      <p:sp>
+        <p:nvSpPr>
+          <p:cNvPr id="2" name="Título 1"/>
+          <p:cNvSpPr>
+            <a:spLocks noGrp="1"/>
+          </p:cNvSpPr>
+          <p:nvPr>
+            <p:ph type="title"/>
+          </p:nvPr>
+        </p:nvSpPr>
+        <p:spPr>
+          <a:xfrm>
+            <a:off x="767290" y="1166932"/>
+            <a:ext cx="3582073" cy="4279709"/>
+          </a:xfrm>
+        </p:spPr>
+        <p:txBody>
+          <a:bodyPr vert="horz" lIns="91440" tIns="45720" rIns="91440" bIns="45720" rtlCol="0" anchor="ctr">
+            <a:normAutofit/>
+          </a:bodyPr>
+          <a:lstStyle/>
+          <a:p>
+            <a:r>
+              <a:rPr lang="en-US" sz="4800" b="1">
+                <a:solidFill>
+                  <a:schemeClr val="bg1"/>
+                </a:solidFill>
+              </a:rPr>
+              <a:t>Conclusão</a:t>
+            </a:r>
+          </a:p>
+        </p:txBody>
+      </p:sp>
+      <p:sp>
+        <p:nvSpPr>
+          <p:cNvPr id="4" name="Espaço Reservado para Conteúdo 3">
+            <a:extLst>
+              <a:ext uri="{FF2B5EF4-FFF2-40B4-BE49-F238E27FC236}">
+                <a16:creationId xmlns:a16="http://schemas.microsoft.com/office/drawing/2014/main" id="{D60F2E2B-B424-4796-A81D-7FC15DE8CDF8}"/>
+              </a:ext>
+            </a:extLst>
+          </p:cNvPr>
+          <p:cNvSpPr>
+            <a:spLocks noGrp="1"/>
+          </p:cNvSpPr>
+          <p:nvPr>
+            <p:ph idx="1"/>
+          </p:nvPr>
+        </p:nvSpPr>
+        <p:spPr>
+          <a:xfrm>
+            <a:off x="5573864" y="1166933"/>
+            <a:ext cx="5716988" cy="4279709"/>
+          </a:xfrm>
+        </p:spPr>
+        <p:txBody>
+          <a:bodyPr anchor="ctr">
+            <a:normAutofit/>
+          </a:bodyPr>
+          <a:lstStyle/>
+          <a:p>
+            <a:r>
+              <a:rPr lang="pt-BR" sz="2400" kern="100" dirty="0">
+                <a:effectLst/>
+                <a:latin typeface="Arial" panose="020B0604020202020204" pitchFamily="34" charset="0"/>
+                <a:ea typeface="NSimSun" panose="02010609030101010101" pitchFamily="49" charset="-122"/>
+                <a:cs typeface="Lucida Sans" panose="020B0602030504020204" pitchFamily="34" charset="0"/>
+              </a:rPr>
+              <a:t>Em relação aos objetivos traçados neste projeto, pode-se afirmar que eles foram obtidos com sucesso, o sistema desenvolvido possui todos os requisitos necessários para resolver a problemática da qual esse trabalho teve origem.</a:t>
+            </a:r>
+            <a:endParaRPr lang="pt-BR" sz="2400" kern="100" dirty="0">
+              <a:effectLst/>
+              <a:latin typeface="Liberation Serif"/>
+              <a:ea typeface="NSimSun" panose="02010609030101010101" pitchFamily="49" charset="-122"/>
+              <a:cs typeface="Lucida Sans" panose="020B0602030504020204" pitchFamily="34" charset="0"/>
+            </a:endParaRPr>
+          </a:p>
+          <a:p>
+            <a:endParaRPr lang="pt-BR" sz="2400" dirty="0"/>
+          </a:p>
+        </p:txBody>
+      </p:sp>
+    </p:spTree>
+    <p:extLst>
+      <p:ext uri="{BB962C8B-B14F-4D97-AF65-F5344CB8AC3E}">
+        <p14:creationId xmlns:p14="http://schemas.microsoft.com/office/powerpoint/2010/main" val="2586815667"/>
+      </p:ext>
+    </p:extLst>
+  </p:cSld>
+  <p:clrMapOvr>
+    <a:masterClrMapping/>
+  </p:clrMapOvr>
+</p:sld>
+</file>
+
+<file path=ppt/slides/slide8.xml><?xml version="1.0" encoding="utf-8"?>
+<p:sld xmlns:a="http://schemas.openxmlformats.org/drawingml/2006/main" xmlns:r="http://schemas.openxmlformats.org/officeDocument/2006/relationships" xmlns:p="http://schemas.openxmlformats.org/presentationml/2006/main">
+  <p:cSld>
+    <p:bg>
+      <p:bgPr>
+        <a:solidFill>
+          <a:schemeClr val="bg1"/>
+        </a:solidFill>
+        <a:effectLst/>
+      </p:bgPr>
+    </p:bg>
+    <p:spTree>
+      <p:nvGrpSpPr>
+        <p:cNvPr id="1" name=""/>
+        <p:cNvGrpSpPr/>
+        <p:nvPr/>
+      </p:nvGrpSpPr>
+      <p:grpSpPr>
+        <a:xfrm>
+          <a:off x="0" y="0"/>
+          <a:ext cx="0" cy="0"/>
+          <a:chOff x="0" y="0"/>
+          <a:chExt cx="0" cy="0"/>
+        </a:xfrm>
+      </p:grpSpPr>
+      <p:sp useBgFill="1">
+        <p:nvSpPr>
+          <p:cNvPr id="8" name="Rectangle 7">
+            <a:extLst>
+              <a:ext uri="{FF2B5EF4-FFF2-40B4-BE49-F238E27FC236}">
+                <a16:creationId xmlns:a16="http://schemas.microsoft.com/office/drawing/2014/main" id="{A61E7EDE-CB4A-402F-B0FB-8640C3589105}"/>
+              </a:ext>
+              <a:ext uri="{C183D7F6-B498-43B3-948B-1728B52AA6E4}">
+                <adec:decorative xmlns:adec="http://schemas.microsoft.com/office/drawing/2017/decorative" val="1"/>
+              </a:ext>
+            </a:extLst>
+          </p:cNvPr>
+          <p:cNvSpPr>
+            <a:spLocks noGrp="1" noRot="1" noChangeAspect="1" noMove="1" noResize="1" noEditPoints="1" noAdjustHandles="1" noChangeArrowheads="1" noChangeShapeType="1" noTextEdit="1"/>
+          </p:cNvSpPr>
+          <p:nvPr>
+            <p:extLst>
+              <p:ext uri="{386F3935-93C4-4BCD-93E2-E3B085C9AB24}">
+                <p16:designElem xmlns:p16="http://schemas.microsoft.com/office/powerpoint/2015/main" val="1"/>
+              </p:ext>
+            </p:extLst>
+          </p:nvPr>
+        </p:nvSpPr>
+        <p:spPr>
+          <a:xfrm>
+            <a:off x="3048" y="0"/>
+            <a:ext cx="12188952" cy="6858000"/>
+          </a:xfrm>
+          <a:prstGeom prst="rect">
+            <a:avLst/>
+          </a:prstGeom>
+          <a:ln>
+            <a:noFill/>
+          </a:ln>
+        </p:spPr>
+        <p:style>
+          <a:lnRef idx="2">
+            <a:schemeClr val="accent1">
+              <a:shade val="50000"/>
+            </a:schemeClr>
+          </a:lnRef>
+          <a:fillRef idx="1">
+            <a:schemeClr val="accent1"/>
+          </a:fillRef>
+          <a:effectRef idx="0">
+            <a:schemeClr val="accent1"/>
+          </a:effectRef>
+          <a:fontRef idx="minor">
+            <a:schemeClr val="lt1"/>
+          </a:fontRef>
+        </p:style>
+        <p:txBody>
+          <a:bodyPr rtlCol="0" anchor="ctr"/>
+          <a:lstStyle/>
+          <a:p>
+            <a:pPr algn="ctr"/>
+            <a:endParaRPr lang="en-US"/>
+          </a:p>
+        </p:txBody>
+      </p:sp>
+      <p:sp>
+        <p:nvSpPr>
+          <p:cNvPr id="10" name="Rectangle 9">
+            <a:extLst>
+              <a:ext uri="{FF2B5EF4-FFF2-40B4-BE49-F238E27FC236}">
+                <a16:creationId xmlns:a16="http://schemas.microsoft.com/office/drawing/2014/main" id="{6C2BBEB8-4077-499F-80FD-AA9827A8D8B7}"/>
+              </a:ext>
+              <a:ext uri="{C183D7F6-B498-43B3-948B-1728B52AA6E4}">
+                <adec:decorative xmlns:adec="http://schemas.microsoft.com/office/drawing/2017/decorative" val="1"/>
+              </a:ext>
+            </a:extLst>
+          </p:cNvPr>
+          <p:cNvSpPr>
+            <a:spLocks noGrp="1" noRot="1" noChangeAspect="1" noMove="1" noResize="1" noEditPoints="1" noAdjustHandles="1" noChangeArrowheads="1" noChangeShapeType="1" noTextEdit="1"/>
+          </p:cNvSpPr>
+          <p:nvPr>
+            <p:extLst>
+              <p:ext uri="{386F3935-93C4-4BCD-93E2-E3B085C9AB24}">
+                <p16:designElem xmlns:p16="http://schemas.microsoft.com/office/powerpoint/2015/main" val="1"/>
+              </p:ext>
+            </p:extLst>
+          </p:nvPr>
+        </p:nvSpPr>
+        <p:spPr>
+          <a:xfrm>
+            <a:off x="658395" y="608243"/>
+            <a:ext cx="3380205" cy="5445075"/>
+          </a:xfrm>
+          <a:prstGeom prst="rect">
+            <a:avLst/>
+          </a:prstGeom>
+          <a:solidFill>
+            <a:schemeClr val="tx2">
+              <a:lumMod val="50000"/>
+            </a:schemeClr>
+          </a:solidFill>
+          <a:ln>
+            <a:noFill/>
+          </a:ln>
+        </p:spPr>
+        <p:style>
+          <a:lnRef idx="2">
+            <a:schemeClr val="accent1">
+              <a:shade val="50000"/>
+            </a:schemeClr>
+          </a:lnRef>
+          <a:fillRef idx="1">
+            <a:schemeClr val="accent1"/>
+          </a:fillRef>
+          <a:effectRef idx="0">
+            <a:schemeClr val="accent1"/>
+          </a:effectRef>
+          <a:fontRef idx="minor">
+            <a:schemeClr val="lt1"/>
+          </a:fontRef>
+        </p:style>
+        <p:txBody>
+          <a:bodyPr rtlCol="0" anchor="ctr"/>
+          <a:lstStyle/>
+          <a:p>
+            <a:pPr algn="ctr"/>
+            <a:endParaRPr lang="en-US"/>
+          </a:p>
+        </p:txBody>
+      </p:sp>
+      <p:sp>
+        <p:nvSpPr>
+          <p:cNvPr id="2" name="Título 1">
+            <a:extLst>
+              <a:ext uri="{FF2B5EF4-FFF2-40B4-BE49-F238E27FC236}">
+                <a16:creationId xmlns:a16="http://schemas.microsoft.com/office/drawing/2014/main" id="{D2F29A9D-63A6-467B-AC73-71EFD986083D}"/>
+              </a:ext>
+            </a:extLst>
+          </p:cNvPr>
+          <p:cNvSpPr>
+            <a:spLocks noGrp="1"/>
+          </p:cNvSpPr>
+          <p:nvPr>
+            <p:ph type="title"/>
+          </p:nvPr>
+        </p:nvSpPr>
+        <p:spPr>
+          <a:xfrm>
+            <a:off x="1316791" y="1005303"/>
+            <a:ext cx="2032490" cy="4427309"/>
+          </a:xfrm>
+        </p:spPr>
+        <p:txBody>
+          <a:bodyPr>
+            <a:normAutofit/>
+          </a:bodyPr>
+          <a:lstStyle/>
+          <a:p>
+            <a:r>
+              <a:rPr lang="pt-BR" sz="2800">
+                <a:solidFill>
+                  <a:schemeClr val="bg1"/>
+                </a:solidFill>
+              </a:rPr>
+              <a:t>Futuras Melhorias</a:t>
+            </a:r>
+          </a:p>
+        </p:txBody>
+      </p:sp>
+      <p:sp>
+        <p:nvSpPr>
+          <p:cNvPr id="3" name="Espaço Reservado para Conteúdo 2">
+            <a:extLst>
+              <a:ext uri="{FF2B5EF4-FFF2-40B4-BE49-F238E27FC236}">
+                <a16:creationId xmlns:a16="http://schemas.microsoft.com/office/drawing/2014/main" id="{E629BFD6-88C9-4EF3-8B97-EA0CE82D28CA}"/>
+              </a:ext>
+            </a:extLst>
+          </p:cNvPr>
+          <p:cNvSpPr>
+            <a:spLocks noGrp="1"/>
+          </p:cNvSpPr>
+          <p:nvPr>
+            <p:ph idx="1"/>
+          </p:nvPr>
+        </p:nvSpPr>
+        <p:spPr>
+          <a:xfrm>
+            <a:off x="5336498" y="1288934"/>
+            <a:ext cx="5801194" cy="4280132"/>
+          </a:xfrm>
+        </p:spPr>
+        <p:txBody>
+          <a:bodyPr anchor="ctr">
+            <a:normAutofit/>
+          </a:bodyPr>
+          <a:lstStyle/>
+          <a:p>
+            <a:r>
+              <a:rPr lang="pt-BR" sz="2000"/>
+              <a:t>Deixar o sistema responsivo;</a:t>
+            </a:r>
+          </a:p>
+        </p:txBody>
+      </p:sp>
+      <p:sp>
+        <p:nvSpPr>
+          <p:cNvPr id="12" name="Rectangle 11">
+            <a:extLst>
+              <a:ext uri="{FF2B5EF4-FFF2-40B4-BE49-F238E27FC236}">
+                <a16:creationId xmlns:a16="http://schemas.microsoft.com/office/drawing/2014/main" id="{6F3B7728-0C26-4662-B285-85C645523C10}"/>
+              </a:ext>
+              <a:ext uri="{C183D7F6-B498-43B3-948B-1728B52AA6E4}">
+                <adec:decorative xmlns:adec="http://schemas.microsoft.com/office/drawing/2017/decorative" val="1"/>
+              </a:ext>
+            </a:extLst>
+          </p:cNvPr>
+          <p:cNvSpPr>
+            <a:spLocks noGrp="1" noRot="1" noChangeAspect="1" noMove="1" noResize="1" noEditPoints="1" noAdjustHandles="1" noChangeArrowheads="1" noChangeShapeType="1" noTextEdit="1"/>
+          </p:cNvSpPr>
+          <p:nvPr>
+            <p:extLst>
+              <p:ext uri="{386F3935-93C4-4BCD-93E2-E3B085C9AB24}">
+                <p16:designElem xmlns:p16="http://schemas.microsoft.com/office/powerpoint/2015/main" val="1"/>
+              </p:ext>
+            </p:extLst>
+          </p:nvPr>
+        </p:nvSpPr>
+        <p:spPr>
+          <a:xfrm>
+            <a:off x="0" y="6053319"/>
+            <a:ext cx="12192000" cy="64008"/>
+          </a:xfrm>
+          <a:prstGeom prst="rect">
+            <a:avLst/>
+          </a:prstGeom>
+          <a:solidFill>
+            <a:schemeClr val="tx2">
+              <a:lumMod val="50000"/>
+            </a:schemeClr>
+          </a:solidFill>
+          <a:ln>
+            <a:noFill/>
+          </a:ln>
+        </p:spPr>
+        <p:style>
+          <a:lnRef idx="2">
+            <a:schemeClr val="accent1">
+              <a:shade val="50000"/>
+            </a:schemeClr>
+          </a:lnRef>
+          <a:fillRef idx="1">
+            <a:schemeClr val="accent1"/>
+          </a:fillRef>
+          <a:effectRef idx="0">
+            <a:schemeClr val="accent1"/>
+          </a:effectRef>
+          <a:fontRef idx="minor">
+            <a:schemeClr val="lt1"/>
+          </a:fontRef>
+        </p:style>
+        <p:txBody>
+          <a:bodyPr rtlCol="0" anchor="ctr"/>
+          <a:lstStyle/>
+          <a:p>
+            <a:pPr algn="ctr"/>
+            <a:endParaRPr lang="en-US" dirty="0"/>
+          </a:p>
+        </p:txBody>
+      </p:sp>
+      <p:sp>
+        <p:nvSpPr>
+          <p:cNvPr id="14" name="Rectangle 13">
+            <a:extLst>
+              <a:ext uri="{FF2B5EF4-FFF2-40B4-BE49-F238E27FC236}">
+                <a16:creationId xmlns:a16="http://schemas.microsoft.com/office/drawing/2014/main" id="{28C367AD-9838-470A-87EF-678609CC8692}"/>
+              </a:ext>
+              <a:ext uri="{C183D7F6-B498-43B3-948B-1728B52AA6E4}">
+                <adec:decorative xmlns:adec="http://schemas.microsoft.com/office/drawing/2017/decorative" val="1"/>
+              </a:ext>
+            </a:extLst>
+          </p:cNvPr>
+          <p:cNvSpPr>
+            <a:spLocks noGrp="1" noRot="1" noChangeAspect="1" noMove="1" noResize="1" noEditPoints="1" noAdjustHandles="1" noChangeArrowheads="1" noChangeShapeType="1" noTextEdit="1"/>
+          </p:cNvSpPr>
+          <p:nvPr>
+            <p:extLst>
+              <p:ext uri="{386F3935-93C4-4BCD-93E2-E3B085C9AB24}">
+                <p16:designElem xmlns:p16="http://schemas.microsoft.com/office/powerpoint/2015/main" val="1"/>
+              </p:ext>
+            </p:extLst>
+          </p:nvPr>
+        </p:nvSpPr>
+        <p:spPr>
+          <a:xfrm rot="5400000">
+            <a:off x="-2770606" y="3396997"/>
+            <a:ext cx="6858002" cy="64008"/>
+          </a:xfrm>
+          <a:prstGeom prst="rect">
+            <a:avLst/>
+          </a:prstGeom>
+          <a:solidFill>
+            <a:schemeClr val="tx2">
+              <a:lumMod val="50000"/>
+            </a:schemeClr>
+          </a:solidFill>
+          <a:ln>
+            <a:noFill/>
+          </a:ln>
+        </p:spPr>
+        <p:style>
+          <a:lnRef idx="2">
+            <a:schemeClr val="accent1">
+              <a:shade val="50000"/>
+            </a:schemeClr>
+          </a:lnRef>
+          <a:fillRef idx="1">
+            <a:schemeClr val="accent1"/>
+          </a:fillRef>
+          <a:effectRef idx="0">
+            <a:schemeClr val="accent1"/>
+          </a:effectRef>
+          <a:fontRef idx="minor">
+            <a:schemeClr val="lt1"/>
+          </a:fontRef>
+        </p:style>
+        <p:txBody>
+          <a:bodyPr rtlCol="0" anchor="ctr"/>
+          <a:lstStyle/>
+          <a:p>
+            <a:pPr algn="ctr"/>
+            <a:endParaRPr lang="en-US"/>
+          </a:p>
+        </p:txBody>
+      </p:sp>
+      <p:sp>
+        <p:nvSpPr>
+          <p:cNvPr id="16" name="Rectangle 15">
+            <a:extLst>
+              <a:ext uri="{FF2B5EF4-FFF2-40B4-BE49-F238E27FC236}">
+                <a16:creationId xmlns:a16="http://schemas.microsoft.com/office/drawing/2014/main" id="{B0CF1642-4E76-4223-A010-6334380A22EA}"/>
+              </a:ext>
+              <a:ext uri="{C183D7F6-B498-43B3-948B-1728B52AA6E4}">
+                <adec:decorative xmlns:adec="http://schemas.microsoft.com/office/drawing/2017/decorative" val="1"/>
+              </a:ext>
+            </a:extLst>
+          </p:cNvPr>
+          <p:cNvSpPr>
+            <a:spLocks noGrp="1" noRot="1" noChangeAspect="1" noMove="1" noResize="1" noEditPoints="1" noAdjustHandles="1" noChangeArrowheads="1" noChangeShapeType="1" noTextEdit="1"/>
+          </p:cNvSpPr>
+          <p:nvPr>
+            <p:extLst>
+              <p:ext uri="{386F3935-93C4-4BCD-93E2-E3B085C9AB24}">
+                <p16:designElem xmlns:p16="http://schemas.microsoft.com/office/powerpoint/2015/main" val="1"/>
+              </p:ext>
+            </p:extLst>
+          </p:nvPr>
+        </p:nvSpPr>
+        <p:spPr>
+          <a:xfrm>
+            <a:off x="0" y="544236"/>
+            <a:ext cx="12192000" cy="64008"/>
+          </a:xfrm>
+          <a:prstGeom prst="rect">
+            <a:avLst/>
+          </a:prstGeom>
+          <a:solidFill>
+            <a:schemeClr val="tx2">
+              <a:lumMod val="50000"/>
+            </a:schemeClr>
+          </a:solidFill>
+          <a:ln>
+            <a:noFill/>
+          </a:ln>
+        </p:spPr>
+        <p:style>
+          <a:lnRef idx="2">
+            <a:schemeClr val="accent1">
+              <a:shade val="50000"/>
+            </a:schemeClr>
+          </a:lnRef>
+          <a:fillRef idx="1">
+            <a:schemeClr val="accent1"/>
+          </a:fillRef>
+          <a:effectRef idx="0">
+            <a:schemeClr val="accent1"/>
+          </a:effectRef>
+          <a:fontRef idx="minor">
+            <a:schemeClr val="lt1"/>
+          </a:fontRef>
+        </p:style>
+        <p:txBody>
+          <a:bodyPr rtlCol="0" anchor="ctr"/>
+          <a:lstStyle/>
+          <a:p>
+            <a:pPr algn="ctr"/>
+            <a:endParaRPr lang="en-US" dirty="0"/>
+          </a:p>
+        </p:txBody>
+      </p:sp>
+    </p:spTree>
+    <p:extLst>
+      <p:ext uri="{BB962C8B-B14F-4D97-AF65-F5344CB8AC3E}">
+        <p14:creationId xmlns:p14="http://schemas.microsoft.com/office/powerpoint/2010/main" val="1726175477"/>
+      </p:ext>
+    </p:extLst>
+  </p:cSld>
+  <p:clrMapOvr>
+    <a:masterClrMapping/>
+  </p:clrMapOvr>
+</p:sld>
+</file>
+
+<file path=ppt/slides/slide9.xml><?xml version="1.0" encoding="utf-8"?>
+<p:sld xmlns:a="http://schemas.openxmlformats.org/drawingml/2006/main" xmlns:r="http://schemas.openxmlformats.org/officeDocument/2006/relationships" xmlns:p="http://schemas.openxmlformats.org/presentationml/2006/main">
+  <p:cSld>
+    <p:bg>
+      <p:bgPr>
+        <a:solidFill>
+          <a:schemeClr val="bg1"/>
+        </a:solidFill>
+        <a:effectLst/>
+      </p:bgPr>
+    </p:bg>
+    <p:spTree>
+      <p:nvGrpSpPr>
+        <p:cNvPr id="1" name=""/>
+        <p:cNvGrpSpPr/>
+        <p:nvPr/>
+      </p:nvGrpSpPr>
+      <p:grpSpPr>
+        <a:xfrm>
+          <a:off x="0" y="0"/>
+          <a:ext cx="0" cy="0"/>
+          <a:chOff x="0" y="0"/>
+          <a:chExt cx="0" cy="0"/>
+        </a:xfrm>
+      </p:grpSpPr>
       <p:sp>
         <p:nvSpPr>
           <p:cNvPr id="8" name="Rectangle 7">
@@ -5161,16 +7334,24 @@
           <a:gradFill>
             <a:gsLst>
               <a:gs pos="0">
-                <a:schemeClr val="accent2"/>
+                <a:schemeClr val="accent1">
+                  <a:lumMod val="90000"/>
+                </a:schemeClr>
               </a:gs>
               <a:gs pos="25000">
-                <a:schemeClr val="accent2"/>
+                <a:schemeClr val="accent1">
+                  <a:lumMod val="90000"/>
+                </a:schemeClr>
               </a:gs>
               <a:gs pos="94000">
-                <a:schemeClr val="accent1"/>
+                <a:schemeClr val="bg2">
+                  <a:lumMod val="25000"/>
+                </a:schemeClr>
               </a:gs>
               <a:gs pos="100000">
-                <a:schemeClr val="accent1"/>
+                <a:schemeClr val="bg2">
+                  <a:lumMod val="25000"/>
+                </a:schemeClr>
               </a:gs>
             </a:gsLst>
             <a:lin ang="4200000" scaled="0"/>
@@ -5251,7 +7432,13 @@
       </p:pic>
       <p:sp>
         <p:nvSpPr>
-          <p:cNvPr id="2" name="Título 1"/>
+          <p:cNvPr id="2" name="Título 1">
+            <a:extLst>
+              <a:ext uri="{FF2B5EF4-FFF2-40B4-BE49-F238E27FC236}">
+                <a16:creationId xmlns:a16="http://schemas.microsoft.com/office/drawing/2014/main" id="{EEFB7FFB-72AA-42D3-B126-00AA05964EE3}"/>
+              </a:ext>
+            </a:extLst>
+          </p:cNvPr>
           <p:cNvSpPr>
             <a:spLocks noGrp="1"/>
           </p:cNvSpPr>
@@ -5273,7 +7460,7 @@
           <a:p>
             <a:pPr algn="ctr"/>
             <a:r>
-              <a:rPr lang="en-US" sz="6000" b="1" kern="1200">
+              <a:rPr lang="en-US" sz="6000" kern="1200" dirty="0" err="1">
                 <a:solidFill>
                   <a:srgbClr val="FFFFFF"/>
                 </a:solidFill>
@@ -5281,15 +7468,23 @@
                 <a:ea typeface="+mj-ea"/>
                 <a:cs typeface="+mj-cs"/>
               </a:rPr>
-              <a:t>Conclusão</a:t>
-            </a:r>
+              <a:t>Obrigado</a:t>
+            </a:r>
+            <a:endParaRPr lang="en-US" sz="6000" kern="1200" dirty="0">
+              <a:solidFill>
+                <a:srgbClr val="FFFFFF"/>
+              </a:solidFill>
+              <a:latin typeface="+mj-lt"/>
+              <a:ea typeface="+mj-ea"/>
+              <a:cs typeface="+mj-cs"/>
+            </a:endParaRPr>
           </a:p>
         </p:txBody>
       </p:sp>
     </p:spTree>
     <p:extLst>
       <p:ext uri="{BB962C8B-B14F-4D97-AF65-F5344CB8AC3E}">
-        <p14:creationId xmlns:p14="http://schemas.microsoft.com/office/powerpoint/2010/main" val="2586815667"/>
+        <p14:creationId xmlns:p14="http://schemas.microsoft.com/office/powerpoint/2010/main" val="2568310829"/>
       </p:ext>
     </p:extLst>
   </p:cSld>

</xml_diff>